<commit_message>
updated PPT missing images & correct write-up docx
</commit_message>
<xml_diff>
--- a/Avocado Presentation.pptx
+++ b/Avocado Presentation.pptx
@@ -26,23 +26,24 @@
     <p:sldId id="271" r:id="rId21"/>
     <p:sldId id="272" r:id="rId22"/>
     <p:sldId id="273" r:id="rId23"/>
+    <p:sldId id="274" r:id="rId24"/>
   </p:sldIdLst>
   <p:sldSz cy="5143500" cx="9144000"/>
   <p:notesSz cx="6858000" cy="9144000"/>
   <p:embeddedFontLst>
     <p:embeddedFont>
       <p:font typeface="Playfair Display"/>
-      <p:regular r:id="rId24"/>
-      <p:bold r:id="rId25"/>
-      <p:italic r:id="rId26"/>
-      <p:boldItalic r:id="rId27"/>
+      <p:regular r:id="rId25"/>
+      <p:bold r:id="rId26"/>
+      <p:italic r:id="rId27"/>
+      <p:boldItalic r:id="rId28"/>
     </p:embeddedFont>
     <p:embeddedFont>
       <p:font typeface="Lato"/>
-      <p:regular r:id="rId28"/>
-      <p:bold r:id="rId29"/>
-      <p:italic r:id="rId30"/>
-      <p:boldItalic r:id="rId31"/>
+      <p:regular r:id="rId29"/>
+      <p:bold r:id="rId30"/>
+      <p:italic r:id="rId31"/>
+      <p:boldItalic r:id="rId32"/>
     </p:embeddedFont>
   </p:embeddedFontLst>
   <p:defaultTextStyle>
@@ -804,7 +805,8 @@
               <a:buNone/>
             </a:pPr>
             <a:r>
-              <a:t/>
+              <a:rPr lang="en"/>
+              <a:t>Laura</a:t>
             </a:r>
             <a:endParaRPr/>
           </a:p>
@@ -823,7 +825,7 @@
   <p:cSld>
     <p:spTree>
       <p:nvGrpSpPr>
-        <p:cNvPr id="129" name="Shape 129"/>
+        <p:cNvPr id="135" name="Shape 135"/>
         <p:cNvGrpSpPr/>
         <p:nvPr/>
       </p:nvGrpSpPr>
@@ -837,7 +839,7 @@
       </p:grpSpPr>
       <p:sp>
         <p:nvSpPr>
-          <p:cNvPr id="130" name="Google Shape;130;ga27162b07c_3_26:notes"/>
+          <p:cNvPr id="136" name="Google Shape;136;ga27162b07c_3_26:notes"/>
           <p:cNvSpPr/>
           <p:nvPr>
             <p:ph idx="2" type="sldImg"/>
@@ -872,7 +874,7 @@
       </p:sp>
       <p:sp>
         <p:nvSpPr>
-          <p:cNvPr id="131" name="Google Shape;131;ga27162b07c_3_26:notes"/>
+          <p:cNvPr id="137" name="Google Shape;137;ga27162b07c_3_26:notes"/>
           <p:cNvSpPr txBox="1"/>
           <p:nvPr>
             <p:ph idx="1" type="body"/>
@@ -903,7 +905,8 @@
               <a:buNone/>
             </a:pPr>
             <a:r>
-              <a:t/>
+              <a:rPr lang="en"/>
+              <a:t>Jeremy</a:t>
             </a:r>
             <a:endParaRPr/>
           </a:p>
@@ -922,7 +925,7 @@
   <p:cSld>
     <p:spTree>
       <p:nvGrpSpPr>
-        <p:cNvPr id="138" name="Shape 138"/>
+        <p:cNvPr id="144" name="Shape 144"/>
         <p:cNvGrpSpPr/>
         <p:nvPr/>
       </p:nvGrpSpPr>
@@ -936,7 +939,7 @@
       </p:grpSpPr>
       <p:sp>
         <p:nvSpPr>
-          <p:cNvPr id="139" name="Google Shape;139;ga27162b07c_3_36:notes"/>
+          <p:cNvPr id="145" name="Google Shape;145;ga27162b07c_3_36:notes"/>
           <p:cNvSpPr/>
           <p:nvPr>
             <p:ph idx="2" type="sldImg"/>
@@ -971,7 +974,7 @@
       </p:sp>
       <p:sp>
         <p:nvSpPr>
-          <p:cNvPr id="140" name="Google Shape;140;ga27162b07c_3_36:notes"/>
+          <p:cNvPr id="146" name="Google Shape;146;ga27162b07c_3_36:notes"/>
           <p:cNvSpPr txBox="1"/>
           <p:nvPr>
             <p:ph idx="1" type="body"/>
@@ -1002,7 +1005,8 @@
               <a:buNone/>
             </a:pPr>
             <a:r>
-              <a:t/>
+              <a:rPr lang="en"/>
+              <a:t>Jeremy</a:t>
             </a:r>
             <a:endParaRPr/>
           </a:p>
@@ -1021,7 +1025,7 @@
   <p:cSld>
     <p:spTree>
       <p:nvGrpSpPr>
-        <p:cNvPr id="143" name="Shape 143"/>
+        <p:cNvPr id="149" name="Shape 149"/>
         <p:cNvGrpSpPr/>
         <p:nvPr/>
       </p:nvGrpSpPr>
@@ -1035,7 +1039,7 @@
       </p:grpSpPr>
       <p:sp>
         <p:nvSpPr>
-          <p:cNvPr id="144" name="Google Shape;144;ga27162b07c_3_14:notes"/>
+          <p:cNvPr id="150" name="Google Shape;150;ga27162b07c_3_14:notes"/>
           <p:cNvSpPr/>
           <p:nvPr>
             <p:ph idx="2" type="sldImg"/>
@@ -1070,7 +1074,7 @@
       </p:sp>
       <p:sp>
         <p:nvSpPr>
-          <p:cNvPr id="145" name="Google Shape;145;ga27162b07c_3_14:notes"/>
+          <p:cNvPr id="151" name="Google Shape;151;ga27162b07c_3_14:notes"/>
           <p:cNvSpPr txBox="1"/>
           <p:nvPr>
             <p:ph idx="1" type="body"/>
@@ -1101,7 +1105,8 @@
               <a:buNone/>
             </a:pPr>
             <a:r>
-              <a:t/>
+              <a:rPr lang="en"/>
+              <a:t>Jeremy</a:t>
             </a:r>
             <a:endParaRPr/>
           </a:p>
@@ -1120,7 +1125,7 @@
   <p:cSld>
     <p:spTree>
       <p:nvGrpSpPr>
-        <p:cNvPr id="152" name="Shape 152"/>
+        <p:cNvPr id="157" name="Shape 157"/>
         <p:cNvGrpSpPr/>
         <p:nvPr/>
       </p:nvGrpSpPr>
@@ -1134,7 +1139,7 @@
       </p:grpSpPr>
       <p:sp>
         <p:nvSpPr>
-          <p:cNvPr id="153" name="Google Shape;153;ga27162b07c_3_66:notes"/>
+          <p:cNvPr id="158" name="Google Shape;158;ga27162b07c_3_66:notes"/>
           <p:cNvSpPr/>
           <p:nvPr>
             <p:ph idx="2" type="sldImg"/>
@@ -1169,7 +1174,7 @@
       </p:sp>
       <p:sp>
         <p:nvSpPr>
-          <p:cNvPr id="154" name="Google Shape;154;ga27162b07c_3_66:notes"/>
+          <p:cNvPr id="159" name="Google Shape;159;ga27162b07c_3_66:notes"/>
           <p:cNvSpPr txBox="1"/>
           <p:nvPr>
             <p:ph idx="1" type="body"/>
@@ -1200,7 +1205,8 @@
               <a:buNone/>
             </a:pPr>
             <a:r>
-              <a:t/>
+              <a:rPr lang="en"/>
+              <a:t>Jeremy</a:t>
             </a:r>
             <a:endParaRPr/>
           </a:p>
@@ -1219,7 +1225,7 @@
   <p:cSld>
     <p:spTree>
       <p:nvGrpSpPr>
-        <p:cNvPr id="160" name="Shape 160"/>
+        <p:cNvPr id="165" name="Shape 165"/>
         <p:cNvGrpSpPr/>
         <p:nvPr/>
       </p:nvGrpSpPr>
@@ -1233,7 +1239,7 @@
       </p:grpSpPr>
       <p:sp>
         <p:nvSpPr>
-          <p:cNvPr id="161" name="Google Shape;161;ga27162b07c_3_44:notes"/>
+          <p:cNvPr id="166" name="Google Shape;166;ga27162b07c_3_44:notes"/>
           <p:cNvSpPr/>
           <p:nvPr>
             <p:ph idx="2" type="sldImg"/>
@@ -1268,7 +1274,7 @@
       </p:sp>
       <p:sp>
         <p:nvSpPr>
-          <p:cNvPr id="162" name="Google Shape;162;ga27162b07c_3_44:notes"/>
+          <p:cNvPr id="167" name="Google Shape;167;ga27162b07c_3_44:notes"/>
           <p:cNvSpPr txBox="1"/>
           <p:nvPr>
             <p:ph idx="1" type="body"/>
@@ -1299,7 +1305,8 @@
               <a:buNone/>
             </a:pPr>
             <a:r>
-              <a:t/>
+              <a:rPr lang="en"/>
+              <a:t>Jeremy</a:t>
             </a:r>
             <a:endParaRPr/>
           </a:p>
@@ -1318,7 +1325,7 @@
   <p:cSld>
     <p:spTree>
       <p:nvGrpSpPr>
-        <p:cNvPr id="168" name="Shape 168"/>
+        <p:cNvPr id="173" name="Shape 173"/>
         <p:cNvGrpSpPr/>
         <p:nvPr/>
       </p:nvGrpSpPr>
@@ -1332,7 +1339,7 @@
       </p:grpSpPr>
       <p:sp>
         <p:nvSpPr>
-          <p:cNvPr id="169" name="Google Shape;169;gaccc51f7d8_0_3:notes"/>
+          <p:cNvPr id="174" name="Google Shape;174;gaccc51f7d8_0_3:notes"/>
           <p:cNvSpPr/>
           <p:nvPr>
             <p:ph idx="2" type="sldImg"/>
@@ -1367,7 +1374,7 @@
       </p:sp>
       <p:sp>
         <p:nvSpPr>
-          <p:cNvPr id="170" name="Google Shape;170;gaccc51f7d8_0_3:notes"/>
+          <p:cNvPr id="175" name="Google Shape;175;gaccc51f7d8_0_3:notes"/>
           <p:cNvSpPr txBox="1"/>
           <p:nvPr>
             <p:ph idx="1" type="body"/>
@@ -1398,7 +1405,8 @@
               <a:buNone/>
             </a:pPr>
             <a:r>
-              <a:t/>
+              <a:rPr lang="en"/>
+              <a:t>Adrian</a:t>
             </a:r>
             <a:endParaRPr/>
           </a:p>
@@ -1417,7 +1425,7 @@
   <p:cSld>
     <p:spTree>
       <p:nvGrpSpPr>
-        <p:cNvPr id="173" name="Shape 173"/>
+        <p:cNvPr id="178" name="Shape 178"/>
         <p:cNvGrpSpPr/>
         <p:nvPr/>
       </p:nvGrpSpPr>
@@ -1431,7 +1439,7 @@
       </p:grpSpPr>
       <p:sp>
         <p:nvSpPr>
-          <p:cNvPr id="174" name="Google Shape;174;gaccc51f7d8_0_7:notes"/>
+          <p:cNvPr id="179" name="Google Shape;179;gaccc51f7d8_0_7:notes"/>
           <p:cNvSpPr/>
           <p:nvPr>
             <p:ph idx="2" type="sldImg"/>
@@ -1466,7 +1474,7 @@
       </p:sp>
       <p:sp>
         <p:nvSpPr>
-          <p:cNvPr id="175" name="Google Shape;175;gaccc51f7d8_0_7:notes"/>
+          <p:cNvPr id="180" name="Google Shape;180;gaccc51f7d8_0_7:notes"/>
           <p:cNvSpPr txBox="1"/>
           <p:nvPr>
             <p:ph idx="1" type="body"/>
@@ -1497,7 +1505,8 @@
               <a:buNone/>
             </a:pPr>
             <a:r>
-              <a:t/>
+              <a:rPr lang="en"/>
+              <a:t>Adrian</a:t>
             </a:r>
             <a:endParaRPr/>
           </a:p>
@@ -1516,7 +1525,7 @@
   <p:cSld>
     <p:spTree>
       <p:nvGrpSpPr>
-        <p:cNvPr id="180" name="Shape 180"/>
+        <p:cNvPr id="185" name="Shape 185"/>
         <p:cNvGrpSpPr/>
         <p:nvPr/>
       </p:nvGrpSpPr>
@@ -1530,7 +1539,7 @@
       </p:grpSpPr>
       <p:sp>
         <p:nvSpPr>
-          <p:cNvPr id="181" name="Google Shape;181;ga3042a4f0f_0_0:notes"/>
+          <p:cNvPr id="186" name="Google Shape;186;ga3042a4f0f_0_0:notes"/>
           <p:cNvSpPr/>
           <p:nvPr>
             <p:ph idx="2" type="sldImg"/>
@@ -1565,7 +1574,7 @@
       </p:sp>
       <p:sp>
         <p:nvSpPr>
-          <p:cNvPr id="182" name="Google Shape;182;ga3042a4f0f_0_0:notes"/>
+          <p:cNvPr id="187" name="Google Shape;187;ga3042a4f0f_0_0:notes"/>
           <p:cNvSpPr txBox="1"/>
           <p:nvPr>
             <p:ph idx="1" type="body"/>
@@ -1596,7 +1605,8 @@
               <a:buNone/>
             </a:pPr>
             <a:r>
-              <a:t/>
+              <a:rPr lang="en"/>
+              <a:t>Laura</a:t>
             </a:r>
             <a:endParaRPr/>
           </a:p>
@@ -1615,7 +1625,7 @@
   <p:cSld>
     <p:spTree>
       <p:nvGrpSpPr>
-        <p:cNvPr id="187" name="Shape 187"/>
+        <p:cNvPr id="191" name="Shape 191"/>
         <p:cNvGrpSpPr/>
         <p:nvPr/>
       </p:nvGrpSpPr>
@@ -1629,7 +1639,7 @@
       </p:grpSpPr>
       <p:sp>
         <p:nvSpPr>
-          <p:cNvPr id="188" name="Google Shape;188;gc6f83aa91_0_93:notes"/>
+          <p:cNvPr id="192" name="Google Shape;192;ga3042a4f0f_1_0:notes"/>
           <p:cNvSpPr/>
           <p:nvPr>
             <p:ph idx="2" type="sldImg"/>
@@ -1637,8 +1647,8 @@
         </p:nvSpPr>
         <p:spPr>
           <a:xfrm>
-            <a:off x="381188" y="685800"/>
-            <a:ext cx="6096300" cy="3429000"/>
+            <a:off x="381300" y="685800"/>
+            <a:ext cx="6096000" cy="3429000"/>
           </a:xfrm>
           <a:custGeom>
             <a:rect b="b" l="l" r="r" t="t"/>
@@ -1664,7 +1674,7 @@
       </p:sp>
       <p:sp>
         <p:nvSpPr>
-          <p:cNvPr id="189" name="Google Shape;189;gc6f83aa91_0_93:notes"/>
+          <p:cNvPr id="193" name="Google Shape;193;ga3042a4f0f_1_0:notes"/>
           <p:cNvSpPr txBox="1"/>
           <p:nvPr>
             <p:ph idx="1" type="body"/>
@@ -1695,7 +1705,108 @@
               <a:buNone/>
             </a:pPr>
             <a:r>
-              <a:t/>
+              <a:rPr lang="en"/>
+              <a:t>Jeremy</a:t>
+            </a:r>
+            <a:endParaRPr/>
+          </a:p>
+        </p:txBody>
+      </p:sp>
+    </p:spTree>
+  </p:cSld>
+  <p:clrMapOvr>
+    <a:masterClrMapping/>
+  </p:clrMapOvr>
+</p:notes>
+</file>
+
+<file path=ppt/notesSlides/notesSlide19.xml><?xml version="1.0" encoding="utf-8"?>
+<p:notes xmlns:a="http://schemas.openxmlformats.org/drawingml/2006/main" xmlns:r="http://schemas.openxmlformats.org/officeDocument/2006/relationships" xmlns:mc="http://schemas.openxmlformats.org/markup-compatibility/2006" xmlns:mv="urn:schemas-microsoft-com:mac:vml" xmlns:p="http://schemas.openxmlformats.org/presentationml/2006/main" xmlns:c="http://schemas.openxmlformats.org/drawingml/2006/chart" xmlns:dgm="http://schemas.openxmlformats.org/drawingml/2006/diagram" xmlns:o="urn:schemas-microsoft-com:office:office" xmlns:v="urn:schemas-microsoft-com:vml" xmlns:pvml="urn:schemas-microsoft-com:office:powerpoint" xmlns:com="http://schemas.openxmlformats.org/drawingml/2006/compatibility" xmlns:p14="http://schemas.microsoft.com/office/powerpoint/2010/main" xmlns:p15="http://schemas.microsoft.com/office/powerpoint/2012/main" xmlns:ahyp="http://schemas.microsoft.com/office/drawing/2018/hyperlinkcolor" showMasterPhAnim="0" showMasterSp="0">
+  <p:cSld>
+    <p:spTree>
+      <p:nvGrpSpPr>
+        <p:cNvPr id="197" name="Shape 197"/>
+        <p:cNvGrpSpPr/>
+        <p:nvPr/>
+      </p:nvGrpSpPr>
+      <p:grpSpPr>
+        <a:xfrm>
+          <a:off x="0" y="0"/>
+          <a:ext cx="0" cy="0"/>
+          <a:chOff x="0" y="0"/>
+          <a:chExt cx="0" cy="0"/>
+        </a:xfrm>
+      </p:grpSpPr>
+      <p:sp>
+        <p:nvSpPr>
+          <p:cNvPr id="198" name="Google Shape;198;gc6f83aa91_0_93:notes"/>
+          <p:cNvSpPr/>
+          <p:nvPr>
+            <p:ph idx="2" type="sldImg"/>
+          </p:nvPr>
+        </p:nvSpPr>
+        <p:spPr>
+          <a:xfrm>
+            <a:off x="381188" y="685800"/>
+            <a:ext cx="6096300" cy="3429000"/>
+          </a:xfrm>
+          <a:custGeom>
+            <a:rect b="b" l="l" r="r" t="t"/>
+            <a:pathLst>
+              <a:path extrusionOk="0" h="120000" w="120000">
+                <a:moveTo>
+                  <a:pt x="0" y="0"/>
+                </a:moveTo>
+                <a:lnTo>
+                  <a:pt x="120000" y="0"/>
+                </a:lnTo>
+                <a:lnTo>
+                  <a:pt x="120000" y="120000"/>
+                </a:lnTo>
+                <a:lnTo>
+                  <a:pt x="0" y="120000"/>
+                </a:lnTo>
+                <a:close/>
+              </a:path>
+            </a:pathLst>
+          </a:custGeom>
+        </p:spPr>
+      </p:sp>
+      <p:sp>
+        <p:nvSpPr>
+          <p:cNvPr id="199" name="Google Shape;199;gc6f83aa91_0_93:notes"/>
+          <p:cNvSpPr txBox="1"/>
+          <p:nvPr>
+            <p:ph idx="1" type="body"/>
+          </p:nvPr>
+        </p:nvSpPr>
+        <p:spPr>
+          <a:xfrm>
+            <a:off x="685800" y="4343400"/>
+            <a:ext cx="5486400" cy="4114800"/>
+          </a:xfrm>
+          <a:prstGeom prst="rect">
+            <a:avLst/>
+          </a:prstGeom>
+        </p:spPr>
+        <p:txBody>
+          <a:bodyPr anchorCtr="0" anchor="t" bIns="91425" lIns="91425" spcFirstLastPara="1" rIns="91425" wrap="square" tIns="91425">
+            <a:noAutofit/>
+          </a:bodyPr>
+          <a:lstStyle/>
+          <a:p>
+            <a:pPr indent="0" lvl="0" marL="0" rtl="0" algn="l">
+              <a:spcBef>
+                <a:spcPts val="0"/>
+              </a:spcBef>
+              <a:spcAft>
+                <a:spcPts val="0"/>
+              </a:spcAft>
+              <a:buNone/>
+            </a:pPr>
+            <a:r>
+              <a:rPr lang="en"/>
+              <a:t>Everyone :)</a:t>
             </a:r>
             <a:endParaRPr/>
           </a:p>
@@ -1794,7 +1905,8 @@
               <a:buNone/>
             </a:pPr>
             <a:r>
-              <a:t/>
+              <a:rPr lang="en"/>
+              <a:t>Laura</a:t>
             </a:r>
             <a:endParaRPr/>
           </a:p>
@@ -1893,7 +2005,8 @@
               <a:buNone/>
             </a:pPr>
             <a:r>
-              <a:t/>
+              <a:rPr lang="en"/>
+              <a:t>Adrian</a:t>
             </a:r>
             <a:endParaRPr/>
           </a:p>
@@ -1992,7 +2105,8 @@
               <a:buNone/>
             </a:pPr>
             <a:r>
-              <a:t/>
+              <a:rPr lang="en"/>
+              <a:t>Laura</a:t>
             </a:r>
             <a:endParaRPr/>
           </a:p>
@@ -2011,7 +2125,7 @@
   <p:cSld>
     <p:spTree>
       <p:nvGrpSpPr>
-        <p:cNvPr id="89" name="Shape 89"/>
+        <p:cNvPr id="90" name="Shape 90"/>
         <p:cNvGrpSpPr/>
         <p:nvPr/>
       </p:nvGrpSpPr>
@@ -2025,7 +2139,7 @@
       </p:grpSpPr>
       <p:sp>
         <p:nvSpPr>
-          <p:cNvPr id="90" name="Google Shape;90;ga27162b07c_0_13:notes"/>
+          <p:cNvPr id="91" name="Google Shape;91;ga27162b07c_0_13:notes"/>
           <p:cNvSpPr/>
           <p:nvPr>
             <p:ph idx="2" type="sldImg"/>
@@ -2060,7 +2174,7 @@
       </p:sp>
       <p:sp>
         <p:nvSpPr>
-          <p:cNvPr id="91" name="Google Shape;91;ga27162b07c_0_13:notes"/>
+          <p:cNvPr id="92" name="Google Shape;92;ga27162b07c_0_13:notes"/>
           <p:cNvSpPr txBox="1"/>
           <p:nvPr>
             <p:ph idx="1" type="body"/>
@@ -2091,7 +2205,8 @@
               <a:buNone/>
             </a:pPr>
             <a:r>
-              <a:t/>
+              <a:rPr lang="en"/>
+              <a:t>Adrian</a:t>
             </a:r>
             <a:endParaRPr/>
           </a:p>
@@ -2110,7 +2225,7 @@
   <p:cSld>
     <p:spTree>
       <p:nvGrpSpPr>
-        <p:cNvPr id="100" name="Shape 100"/>
+        <p:cNvPr id="102" name="Shape 102"/>
         <p:cNvGrpSpPr/>
         <p:nvPr/>
       </p:nvGrpSpPr>
@@ -2124,7 +2239,7 @@
       </p:grpSpPr>
       <p:sp>
         <p:nvSpPr>
-          <p:cNvPr id="101" name="Google Shape;101;ga27162b07c_2_0:notes"/>
+          <p:cNvPr id="103" name="Google Shape;103;ga27162b07c_2_0:notes"/>
           <p:cNvSpPr/>
           <p:nvPr>
             <p:ph idx="2" type="sldImg"/>
@@ -2159,7 +2274,7 @@
       </p:sp>
       <p:sp>
         <p:nvSpPr>
-          <p:cNvPr id="102" name="Google Shape;102;ga27162b07c_2_0:notes"/>
+          <p:cNvPr id="104" name="Google Shape;104;ga27162b07c_2_0:notes"/>
           <p:cNvSpPr txBox="1"/>
           <p:nvPr>
             <p:ph idx="1" type="body"/>
@@ -2190,7 +2305,8 @@
               <a:buNone/>
             </a:pPr>
             <a:r>
-              <a:t/>
+              <a:rPr lang="en"/>
+              <a:t>Jeremy</a:t>
             </a:r>
             <a:endParaRPr/>
           </a:p>
@@ -2209,7 +2325,7 @@
   <p:cSld>
     <p:spTree>
       <p:nvGrpSpPr>
-        <p:cNvPr id="107" name="Shape 107"/>
+        <p:cNvPr id="113" name="Shape 113"/>
         <p:cNvGrpSpPr/>
         <p:nvPr/>
       </p:nvGrpSpPr>
@@ -2223,7 +2339,7 @@
       </p:grpSpPr>
       <p:sp>
         <p:nvSpPr>
-          <p:cNvPr id="108" name="Google Shape;108;ga27162b07c_3_21:notes"/>
+          <p:cNvPr id="114" name="Google Shape;114;ga27162b07c_3_21:notes"/>
           <p:cNvSpPr/>
           <p:nvPr>
             <p:ph idx="2" type="sldImg"/>
@@ -2258,7 +2374,7 @@
       </p:sp>
       <p:sp>
         <p:nvSpPr>
-          <p:cNvPr id="109" name="Google Shape;109;ga27162b07c_3_21:notes"/>
+          <p:cNvPr id="115" name="Google Shape;115;ga27162b07c_3_21:notes"/>
           <p:cNvSpPr txBox="1"/>
           <p:nvPr>
             <p:ph idx="1" type="body"/>
@@ -2289,7 +2405,8 @@
               <a:buNone/>
             </a:pPr>
             <a:r>
-              <a:t/>
+              <a:rPr lang="en"/>
+              <a:t>Jeremy</a:t>
             </a:r>
             <a:endParaRPr/>
           </a:p>
@@ -2308,7 +2425,7 @@
   <p:cSld>
     <p:spTree>
       <p:nvGrpSpPr>
-        <p:cNvPr id="112" name="Shape 112"/>
+        <p:cNvPr id="118" name="Shape 118"/>
         <p:cNvGrpSpPr/>
         <p:nvPr/>
       </p:nvGrpSpPr>
@@ -2322,7 +2439,7 @@
       </p:grpSpPr>
       <p:sp>
         <p:nvSpPr>
-          <p:cNvPr id="113" name="Google Shape;113;ga27162b07c_3_58:notes"/>
+          <p:cNvPr id="119" name="Google Shape;119;ga27162b07c_3_58:notes"/>
           <p:cNvSpPr/>
           <p:nvPr>
             <p:ph idx="2" type="sldImg"/>
@@ -2357,7 +2474,7 @@
       </p:sp>
       <p:sp>
         <p:nvSpPr>
-          <p:cNvPr id="114" name="Google Shape;114;ga27162b07c_3_58:notes"/>
+          <p:cNvPr id="120" name="Google Shape;120;ga27162b07c_3_58:notes"/>
           <p:cNvSpPr txBox="1"/>
           <p:nvPr>
             <p:ph idx="1" type="body"/>
@@ -2388,7 +2505,8 @@
               <a:buNone/>
             </a:pPr>
             <a:r>
-              <a:t/>
+              <a:rPr lang="en"/>
+              <a:t>Jeremy</a:t>
             </a:r>
             <a:endParaRPr/>
           </a:p>
@@ -2407,7 +2525,7 @@
   <p:cSld>
     <p:spTree>
       <p:nvGrpSpPr>
-        <p:cNvPr id="121" name="Shape 121"/>
+        <p:cNvPr id="127" name="Shape 127"/>
         <p:cNvGrpSpPr/>
         <p:nvPr/>
       </p:nvGrpSpPr>
@@ -2421,7 +2539,7 @@
       </p:grpSpPr>
       <p:sp>
         <p:nvSpPr>
-          <p:cNvPr id="122" name="Google Shape;122;ga27162b07c_3_9:notes"/>
+          <p:cNvPr id="128" name="Google Shape;128;ga27162b07c_3_9:notes"/>
           <p:cNvSpPr/>
           <p:nvPr>
             <p:ph idx="2" type="sldImg"/>
@@ -2456,7 +2574,7 @@
       </p:sp>
       <p:sp>
         <p:nvSpPr>
-          <p:cNvPr id="123" name="Google Shape;123;ga27162b07c_3_9:notes"/>
+          <p:cNvPr id="129" name="Google Shape;129;ga27162b07c_3_9:notes"/>
           <p:cNvSpPr txBox="1"/>
           <p:nvPr>
             <p:ph idx="1" type="body"/>
@@ -2487,7 +2605,8 @@
               <a:buNone/>
             </a:pPr>
             <a:r>
-              <a:t/>
+              <a:rPr lang="en"/>
+              <a:t>Jeremy</a:t>
             </a:r>
             <a:endParaRPr/>
           </a:p>
@@ -8485,7 +8604,7 @@
   <p:cSld>
     <p:spTree>
       <p:nvGrpSpPr>
-        <p:cNvPr id="132" name="Shape 132"/>
+        <p:cNvPr id="138" name="Shape 138"/>
         <p:cNvGrpSpPr/>
         <p:nvPr/>
       </p:nvGrpSpPr>
@@ -8499,7 +8618,7 @@
       </p:grpSpPr>
       <p:sp>
         <p:nvSpPr>
-          <p:cNvPr id="133" name="Google Shape;133;p22"/>
+          <p:cNvPr id="139" name="Google Shape;139;p22"/>
           <p:cNvSpPr txBox="1"/>
           <p:nvPr>
             <p:ph idx="1" type="body"/>
@@ -8507,8 +8626,8 @@
         </p:nvSpPr>
         <p:spPr>
           <a:xfrm>
-            <a:off x="1110275" y="954875"/>
-            <a:ext cx="2736600" cy="1353000"/>
+            <a:off x="142475" y="1538863"/>
+            <a:ext cx="3107100" cy="2065800"/>
           </a:xfrm>
           <a:prstGeom prst="rect">
             <a:avLst/>
@@ -8723,7 +8842,7 @@
       </p:sp>
       <p:pic>
         <p:nvPicPr>
-          <p:cNvPr id="134" name="Google Shape;134;p22"/>
+          <p:cNvPr id="140" name="Google Shape;140;p22"/>
           <p:cNvPicPr preferRelativeResize="0"/>
           <p:nvPr/>
         </p:nvPicPr>
@@ -8751,7 +8870,7 @@
       </p:pic>
       <p:sp>
         <p:nvSpPr>
-          <p:cNvPr id="135" name="Google Shape;135;p22"/>
+          <p:cNvPr id="141" name="Google Shape;141;p22"/>
           <p:cNvSpPr txBox="1"/>
           <p:nvPr/>
         </p:nvSpPr>
@@ -8829,7 +8948,7 @@
       </p:sp>
       <p:sp>
         <p:nvSpPr>
-          <p:cNvPr id="136" name="Google Shape;136;p22"/>
+          <p:cNvPr id="142" name="Google Shape;142;p22"/>
           <p:cNvSpPr txBox="1"/>
           <p:nvPr/>
         </p:nvSpPr>
@@ -8862,13 +8981,7 @@
               <a:buNone/>
             </a:pPr>
             <a:r>
-              <a:rPr lang="en">
-                <a:latin typeface="Lato"/>
-                <a:ea typeface="Lato"/>
-                <a:cs typeface="Lato"/>
-                <a:sym typeface="Lato"/>
-              </a:rPr>
-              <a:t>R Squared:</a:t>
+              <a:t/>
             </a:r>
             <a:endParaRPr>
               <a:latin typeface="Lato"/>
@@ -8877,63 +8990,11 @@
               <a:sym typeface="Lato"/>
             </a:endParaRPr>
           </a:p>
-          <a:p>
-            <a:pPr indent="0" lvl="0" marL="0" rtl="0" algn="l">
-              <a:spcBef>
-                <a:spcPts val="0"/>
-              </a:spcBef>
-              <a:spcAft>
-                <a:spcPts val="0"/>
-              </a:spcAft>
-              <a:buNone/>
-            </a:pPr>
-            <a:r>
-              <a:rPr lang="en">
-                <a:latin typeface="Lato"/>
-                <a:ea typeface="Lato"/>
-                <a:cs typeface="Lato"/>
-                <a:sym typeface="Lato"/>
-              </a:rPr>
-              <a:t>0% does not explain</a:t>
-            </a:r>
-            <a:endParaRPr>
-              <a:latin typeface="Lato"/>
-              <a:ea typeface="Lato"/>
-              <a:cs typeface="Lato"/>
-              <a:sym typeface="Lato"/>
-            </a:endParaRPr>
-          </a:p>
-          <a:p>
-            <a:pPr indent="0" lvl="0" marL="0" rtl="0" algn="l">
-              <a:spcBef>
-                <a:spcPts val="0"/>
-              </a:spcBef>
-              <a:spcAft>
-                <a:spcPts val="0"/>
-              </a:spcAft>
-              <a:buNone/>
-            </a:pPr>
-            <a:r>
-              <a:rPr lang="en">
-                <a:latin typeface="Lato"/>
-                <a:ea typeface="Lato"/>
-                <a:cs typeface="Lato"/>
-                <a:sym typeface="Lato"/>
-              </a:rPr>
-              <a:t>100% perfectly explains</a:t>
-            </a:r>
-            <a:endParaRPr>
-              <a:latin typeface="Lato"/>
-              <a:ea typeface="Lato"/>
-              <a:cs typeface="Lato"/>
-              <a:sym typeface="Lato"/>
-            </a:endParaRPr>
-          </a:p>
         </p:txBody>
       </p:sp>
       <p:sp>
         <p:nvSpPr>
-          <p:cNvPr id="137" name="Google Shape;137;p22"/>
+          <p:cNvPr id="143" name="Google Shape;143;p22"/>
           <p:cNvSpPr txBox="1"/>
           <p:nvPr/>
         </p:nvSpPr>
@@ -9034,7 +9095,7 @@
   <p:cSld>
     <p:spTree>
       <p:nvGrpSpPr>
-        <p:cNvPr id="141" name="Shape 141"/>
+        <p:cNvPr id="147" name="Shape 147"/>
         <p:cNvGrpSpPr/>
         <p:nvPr/>
       </p:nvGrpSpPr>
@@ -9048,7 +9109,7 @@
       </p:grpSpPr>
       <p:sp>
         <p:nvSpPr>
-          <p:cNvPr id="142" name="Google Shape;142;p23"/>
+          <p:cNvPr id="148" name="Google Shape;148;p23"/>
           <p:cNvSpPr txBox="1"/>
           <p:nvPr>
             <p:ph type="title"/>
@@ -9123,7 +9184,7 @@
   <p:cSld>
     <p:spTree>
       <p:nvGrpSpPr>
-        <p:cNvPr id="146" name="Shape 146"/>
+        <p:cNvPr id="152" name="Shape 152"/>
         <p:cNvGrpSpPr/>
         <p:nvPr/>
       </p:nvGrpSpPr>
@@ -9135,69 +9196,9 @@
           <a:chExt cx="0" cy="0"/>
         </a:xfrm>
       </p:grpSpPr>
-      <p:sp>
-        <p:nvSpPr>
-          <p:cNvPr id="147" name="Google Shape;147;p24"/>
-          <p:cNvSpPr txBox="1"/>
-          <p:nvPr>
-            <p:ph idx="1" type="body"/>
-          </p:nvPr>
-        </p:nvSpPr>
-        <p:spPr>
-          <a:xfrm>
-            <a:off x="319500" y="4230575"/>
-            <a:ext cx="5998800" cy="598800"/>
-          </a:xfrm>
-          <a:prstGeom prst="rect">
-            <a:avLst/>
-          </a:prstGeom>
-        </p:spPr>
-        <p:txBody>
-          <a:bodyPr anchorCtr="0" anchor="ctr" bIns="91425" lIns="91425" spcFirstLastPara="1" rIns="91425" wrap="square" tIns="91425">
-            <a:noAutofit/>
-          </a:bodyPr>
-          <a:lstStyle/>
-          <a:p>
-            <a:pPr indent="0" lvl="0" marL="0" rtl="0" algn="l">
-              <a:spcBef>
-                <a:spcPts val="0"/>
-              </a:spcBef>
-              <a:spcAft>
-                <a:spcPts val="0"/>
-              </a:spcAft>
-              <a:buNone/>
-            </a:pPr>
-            <a:r>
-              <a:rPr lang="en"/>
-              <a:t>Millennials</a:t>
-            </a:r>
-            <a:r>
-              <a:rPr lang="en"/>
-              <a:t> vs total Population</a:t>
-            </a:r>
-            <a:endParaRPr/>
-          </a:p>
-          <a:p>
-            <a:pPr indent="0" lvl="0" marL="0" rtl="0" algn="l">
-              <a:spcBef>
-                <a:spcPts val="0"/>
-              </a:spcBef>
-              <a:spcAft>
-                <a:spcPts val="0"/>
-              </a:spcAft>
-              <a:buNone/>
-            </a:pPr>
-            <a:r>
-              <a:rPr lang="en"/>
-              <a:t>plt.subplots()</a:t>
-            </a:r>
-            <a:endParaRPr/>
-          </a:p>
-        </p:txBody>
-      </p:sp>
       <p:pic>
         <p:nvPicPr>
-          <p:cNvPr id="148" name="Google Shape;148;p24"/>
+          <p:cNvPr id="153" name="Google Shape;153;p24"/>
           <p:cNvPicPr preferRelativeResize="0"/>
           <p:nvPr/>
         </p:nvPicPr>
@@ -9225,7 +9226,7 @@
       </p:pic>
       <p:sp>
         <p:nvSpPr>
-          <p:cNvPr id="149" name="Google Shape;149;p24"/>
+          <p:cNvPr id="154" name="Google Shape;154;p24"/>
           <p:cNvSpPr txBox="1"/>
           <p:nvPr/>
         </p:nvSpPr>
@@ -9303,7 +9304,7 @@
       </p:sp>
       <p:pic>
         <p:nvPicPr>
-          <p:cNvPr id="150" name="Google Shape;150;p24"/>
+          <p:cNvPr id="155" name="Google Shape;155;p24"/>
           <p:cNvPicPr preferRelativeResize="0"/>
           <p:nvPr/>
         </p:nvPicPr>
@@ -9331,14 +9332,14 @@
       </p:pic>
       <p:sp>
         <p:nvSpPr>
-          <p:cNvPr id="151" name="Google Shape;151;p24"/>
+          <p:cNvPr id="156" name="Google Shape;156;p24"/>
           <p:cNvSpPr txBox="1"/>
           <p:nvPr/>
         </p:nvSpPr>
         <p:spPr>
           <a:xfrm>
-            <a:off x="4374100" y="4104250"/>
-            <a:ext cx="1033200" cy="276900"/>
+            <a:off x="274450" y="4147000"/>
+            <a:ext cx="1033200" cy="535200"/>
           </a:xfrm>
           <a:prstGeom prst="rect">
             <a:avLst/>
@@ -9386,6 +9387,38 @@
                 <a:sym typeface="Lato"/>
               </a:rPr>
               <a:t>dataset</a:t>
+            </a:r>
+            <a:endParaRPr sz="800">
+              <a:solidFill>
+                <a:schemeClr val="dk2"/>
+              </a:solidFill>
+              <a:latin typeface="Lato"/>
+              <a:ea typeface="Lato"/>
+              <a:cs typeface="Lato"/>
+              <a:sym typeface="Lato"/>
+            </a:endParaRPr>
+          </a:p>
+          <a:p>
+            <a:pPr indent="0" lvl="0" marL="0" rtl="0" algn="l">
+              <a:spcBef>
+                <a:spcPts val="0"/>
+              </a:spcBef>
+              <a:spcAft>
+                <a:spcPts val="0"/>
+              </a:spcAft>
+              <a:buNone/>
+            </a:pPr>
+            <a:r>
+              <a:rPr lang="en" sz="800">
+                <a:solidFill>
+                  <a:schemeClr val="dk2"/>
+                </a:solidFill>
+                <a:latin typeface="Lato"/>
+                <a:ea typeface="Lato"/>
+                <a:cs typeface="Lato"/>
+                <a:sym typeface="Lato"/>
+              </a:rPr>
+              <a:t>np.where[]</a:t>
             </a:r>
             <a:endParaRPr sz="800">
               <a:solidFill>
@@ -9467,7 +9500,7 @@
   <p:cSld>
     <p:spTree>
       <p:nvGrpSpPr>
-        <p:cNvPr id="155" name="Shape 155"/>
+        <p:cNvPr id="160" name="Shape 160"/>
         <p:cNvGrpSpPr/>
         <p:nvPr/>
       </p:nvGrpSpPr>
@@ -9481,7 +9514,7 @@
       </p:grpSpPr>
       <p:sp>
         <p:nvSpPr>
-          <p:cNvPr id="156" name="Google Shape;156;p25"/>
+          <p:cNvPr id="161" name="Google Shape;161;p25"/>
           <p:cNvSpPr txBox="1"/>
           <p:nvPr>
             <p:ph idx="1" type="body"/>
@@ -9541,7 +9574,7 @@
       </p:sp>
       <p:sp>
         <p:nvSpPr>
-          <p:cNvPr id="157" name="Google Shape;157;p25"/>
+          <p:cNvPr id="162" name="Google Shape;162;p25"/>
           <p:cNvSpPr txBox="1"/>
           <p:nvPr/>
         </p:nvSpPr>
@@ -9619,7 +9652,7 @@
       </p:sp>
       <p:pic>
         <p:nvPicPr>
-          <p:cNvPr id="158" name="Google Shape;158;p25"/>
+          <p:cNvPr id="163" name="Google Shape;163;p25"/>
           <p:cNvPicPr preferRelativeResize="0"/>
           <p:nvPr/>
         </p:nvPicPr>
@@ -9647,7 +9680,7 @@
       </p:pic>
       <p:pic>
         <p:nvPicPr>
-          <p:cNvPr id="159" name="Google Shape;159;p25"/>
+          <p:cNvPr id="164" name="Google Shape;164;p25"/>
           <p:cNvPicPr preferRelativeResize="0"/>
           <p:nvPr/>
         </p:nvPicPr>
@@ -9686,7 +9719,7 @@
   <p:cSld>
     <p:spTree>
       <p:nvGrpSpPr>
-        <p:cNvPr id="163" name="Shape 163"/>
+        <p:cNvPr id="168" name="Shape 168"/>
         <p:cNvGrpSpPr/>
         <p:nvPr/>
       </p:nvGrpSpPr>
@@ -9700,7 +9733,7 @@
       </p:grpSpPr>
       <p:sp>
         <p:nvSpPr>
-          <p:cNvPr id="164" name="Google Shape;164;p26"/>
+          <p:cNvPr id="169" name="Google Shape;169;p26"/>
           <p:cNvSpPr txBox="1"/>
           <p:nvPr>
             <p:ph idx="1" type="body"/>
@@ -9708,7 +9741,7 @@
         </p:nvSpPr>
         <p:spPr>
           <a:xfrm>
-            <a:off x="198375" y="1999375"/>
+            <a:off x="191250" y="2308088"/>
             <a:ext cx="3335100" cy="598800"/>
           </a:xfrm>
           <a:prstGeom prst="rect">
@@ -9818,7 +9851,7 @@
       </p:sp>
       <p:pic>
         <p:nvPicPr>
-          <p:cNvPr id="165" name="Google Shape;165;p26"/>
+          <p:cNvPr id="170" name="Google Shape;170;p26"/>
           <p:cNvPicPr preferRelativeResize="0"/>
           <p:nvPr/>
         </p:nvPicPr>
@@ -9846,7 +9879,7 @@
       </p:pic>
       <p:sp>
         <p:nvSpPr>
-          <p:cNvPr id="166" name="Google Shape;166;p26"/>
+          <p:cNvPr id="171" name="Google Shape;171;p26"/>
           <p:cNvSpPr txBox="1"/>
           <p:nvPr/>
         </p:nvSpPr>
@@ -9924,13 +9957,13 @@
       </p:sp>
       <p:sp>
         <p:nvSpPr>
-          <p:cNvPr id="167" name="Google Shape;167;p26"/>
+          <p:cNvPr id="172" name="Google Shape;172;p26"/>
           <p:cNvSpPr txBox="1"/>
           <p:nvPr/>
         </p:nvSpPr>
         <p:spPr>
           <a:xfrm>
-            <a:off x="6625275" y="4616175"/>
+            <a:off x="6625625" y="4616175"/>
             <a:ext cx="2088000" cy="242400"/>
           </a:xfrm>
           <a:prstGeom prst="rect">
@@ -10021,87 +10054,6 @@
 </file>
 
 <file path=ppt/slides/slide15.xml><?xml version="1.0" encoding="utf-8"?>
-<p:sld xmlns:a="http://schemas.openxmlformats.org/drawingml/2006/main" xmlns:r="http://schemas.openxmlformats.org/officeDocument/2006/relationships" xmlns:mc="http://schemas.openxmlformats.org/markup-compatibility/2006" xmlns:mv="urn:schemas-microsoft-com:mac:vml" xmlns:p="http://schemas.openxmlformats.org/presentationml/2006/main" xmlns:c="http://schemas.openxmlformats.org/drawingml/2006/chart" xmlns:dgm="http://schemas.openxmlformats.org/drawingml/2006/diagram" xmlns:o="urn:schemas-microsoft-com:office:office" xmlns:v="urn:schemas-microsoft-com:vml" xmlns:pvml="urn:schemas-microsoft-com:office:powerpoint" xmlns:com="http://schemas.openxmlformats.org/drawingml/2006/compatibility" xmlns:p14="http://schemas.microsoft.com/office/powerpoint/2010/main" xmlns:p15="http://schemas.microsoft.com/office/powerpoint/2012/main" xmlns:ahyp="http://schemas.microsoft.com/office/drawing/2018/hyperlinkcolor">
-  <p:cSld>
-    <p:spTree>
-      <p:nvGrpSpPr>
-        <p:cNvPr id="171" name="Shape 171"/>
-        <p:cNvGrpSpPr/>
-        <p:nvPr/>
-      </p:nvGrpSpPr>
-      <p:grpSpPr>
-        <a:xfrm>
-          <a:off x="0" y="0"/>
-          <a:ext cx="0" cy="0"/>
-          <a:chOff x="0" y="0"/>
-          <a:chExt cx="0" cy="0"/>
-        </a:xfrm>
-      </p:grpSpPr>
-      <p:sp>
-        <p:nvSpPr>
-          <p:cNvPr id="172" name="Google Shape;172;p27"/>
-          <p:cNvSpPr txBox="1"/>
-          <p:nvPr>
-            <p:ph type="title"/>
-          </p:nvPr>
-        </p:nvSpPr>
-        <p:spPr>
-          <a:xfrm>
-            <a:off x="311700" y="1905100"/>
-            <a:ext cx="8520600" cy="626100"/>
-          </a:xfrm>
-          <a:prstGeom prst="rect">
-            <a:avLst/>
-          </a:prstGeom>
-        </p:spPr>
-        <p:txBody>
-          <a:bodyPr anchorCtr="0" anchor="t" bIns="91425" lIns="91425" spcFirstLastPara="1" rIns="91425" wrap="square" tIns="91425">
-            <a:noAutofit/>
-          </a:bodyPr>
-          <a:lstStyle/>
-          <a:p>
-            <a:pPr indent="0" lvl="0" marL="0" rtl="0" algn="ctr">
-              <a:spcBef>
-                <a:spcPts val="0"/>
-              </a:spcBef>
-              <a:spcAft>
-                <a:spcPts val="0"/>
-              </a:spcAft>
-              <a:buNone/>
-            </a:pPr>
-            <a:r>
-              <a:rPr lang="en" sz="3600"/>
-              <a:t>Analysis 3: Temperature </a:t>
-            </a:r>
-            <a:endParaRPr sz="3600"/>
-          </a:p>
-          <a:p>
-            <a:pPr indent="0" lvl="0" marL="0" rtl="0" algn="ctr">
-              <a:spcBef>
-                <a:spcPts val="0"/>
-              </a:spcBef>
-              <a:spcAft>
-                <a:spcPts val="0"/>
-              </a:spcAft>
-              <a:buNone/>
-            </a:pPr>
-            <a:r>
-              <a:rPr lang="en" sz="3600"/>
-              <a:t>Vs. Average Price</a:t>
-            </a:r>
-            <a:endParaRPr sz="3600"/>
-          </a:p>
-        </p:txBody>
-      </p:sp>
-    </p:spTree>
-  </p:cSld>
-  <p:clrMapOvr>
-    <a:masterClrMapping/>
-  </p:clrMapOvr>
-</p:sld>
-</file>
-
-<file path=ppt/slides/slide16.xml><?xml version="1.0" encoding="utf-8"?>
 <p:sld xmlns:a="http://schemas.openxmlformats.org/drawingml/2006/main" xmlns:r="http://schemas.openxmlformats.org/officeDocument/2006/relationships" xmlns:mc="http://schemas.openxmlformats.org/markup-compatibility/2006" xmlns:mv="urn:schemas-microsoft-com:mac:vml" xmlns:p="http://schemas.openxmlformats.org/presentationml/2006/main" xmlns:c="http://schemas.openxmlformats.org/drawingml/2006/chart" xmlns:dgm="http://schemas.openxmlformats.org/drawingml/2006/diagram" xmlns:o="urn:schemas-microsoft-com:office:office" xmlns:v="urn:schemas-microsoft-com:vml" xmlns:pvml="urn:schemas-microsoft-com:office:powerpoint" xmlns:com="http://schemas.openxmlformats.org/drawingml/2006/compatibility" xmlns:p14="http://schemas.microsoft.com/office/powerpoint/2010/main" xmlns:p15="http://schemas.microsoft.com/office/powerpoint/2012/main" xmlns:ahyp="http://schemas.microsoft.com/office/drawing/2018/hyperlinkcolor">
   <p:cSld>
     <p:spTree>
@@ -10120,7 +10072,7 @@
       </p:grpSpPr>
       <p:sp>
         <p:nvSpPr>
-          <p:cNvPr id="177" name="Google Shape;177;p28"/>
+          <p:cNvPr id="177" name="Google Shape;177;p27"/>
           <p:cNvSpPr txBox="1"/>
           <p:nvPr>
             <p:ph type="title"/>
@@ -10128,7 +10080,7 @@
         </p:nvSpPr>
         <p:spPr>
           <a:xfrm>
-            <a:off x="311700" y="391350"/>
+            <a:off x="311700" y="1905100"/>
             <a:ext cx="8520600" cy="626100"/>
           </a:xfrm>
           <a:prstGeom prst="rect">
@@ -10141,6 +10093,87 @@
           </a:bodyPr>
           <a:lstStyle/>
           <a:p>
+            <a:pPr indent="0" lvl="0" marL="0" rtl="0" algn="ctr">
+              <a:spcBef>
+                <a:spcPts val="0"/>
+              </a:spcBef>
+              <a:spcAft>
+                <a:spcPts val="0"/>
+              </a:spcAft>
+              <a:buNone/>
+            </a:pPr>
+            <a:r>
+              <a:rPr lang="en" sz="3600"/>
+              <a:t>Analysis 3: Temperature </a:t>
+            </a:r>
+            <a:endParaRPr sz="3600"/>
+          </a:p>
+          <a:p>
+            <a:pPr indent="0" lvl="0" marL="0" rtl="0" algn="ctr">
+              <a:spcBef>
+                <a:spcPts val="0"/>
+              </a:spcBef>
+              <a:spcAft>
+                <a:spcPts val="0"/>
+              </a:spcAft>
+              <a:buNone/>
+            </a:pPr>
+            <a:r>
+              <a:rPr lang="en" sz="3600"/>
+              <a:t>Vs. Average Price</a:t>
+            </a:r>
+            <a:endParaRPr sz="3600"/>
+          </a:p>
+        </p:txBody>
+      </p:sp>
+    </p:spTree>
+  </p:cSld>
+  <p:clrMapOvr>
+    <a:masterClrMapping/>
+  </p:clrMapOvr>
+</p:sld>
+</file>
+
+<file path=ppt/slides/slide16.xml><?xml version="1.0" encoding="utf-8"?>
+<p:sld xmlns:a="http://schemas.openxmlformats.org/drawingml/2006/main" xmlns:r="http://schemas.openxmlformats.org/officeDocument/2006/relationships" xmlns:mc="http://schemas.openxmlformats.org/markup-compatibility/2006" xmlns:mv="urn:schemas-microsoft-com:mac:vml" xmlns:p="http://schemas.openxmlformats.org/presentationml/2006/main" xmlns:c="http://schemas.openxmlformats.org/drawingml/2006/chart" xmlns:dgm="http://schemas.openxmlformats.org/drawingml/2006/diagram" xmlns:o="urn:schemas-microsoft-com:office:office" xmlns:v="urn:schemas-microsoft-com:vml" xmlns:pvml="urn:schemas-microsoft-com:office:powerpoint" xmlns:com="http://schemas.openxmlformats.org/drawingml/2006/compatibility" xmlns:p14="http://schemas.microsoft.com/office/powerpoint/2010/main" xmlns:p15="http://schemas.microsoft.com/office/powerpoint/2012/main" xmlns:ahyp="http://schemas.microsoft.com/office/drawing/2018/hyperlinkcolor">
+  <p:cSld>
+    <p:spTree>
+      <p:nvGrpSpPr>
+        <p:cNvPr id="181" name="Shape 181"/>
+        <p:cNvGrpSpPr/>
+        <p:nvPr/>
+      </p:nvGrpSpPr>
+      <p:grpSpPr>
+        <a:xfrm>
+          <a:off x="0" y="0"/>
+          <a:ext cx="0" cy="0"/>
+          <a:chOff x="0" y="0"/>
+          <a:chExt cx="0" cy="0"/>
+        </a:xfrm>
+      </p:grpSpPr>
+      <p:sp>
+        <p:nvSpPr>
+          <p:cNvPr id="182" name="Google Shape;182;p28"/>
+          <p:cNvSpPr txBox="1"/>
+          <p:nvPr>
+            <p:ph type="title"/>
+          </p:nvPr>
+        </p:nvSpPr>
+        <p:spPr>
+          <a:xfrm>
+            <a:off x="311700" y="391350"/>
+            <a:ext cx="8520600" cy="626100"/>
+          </a:xfrm>
+          <a:prstGeom prst="rect">
+            <a:avLst/>
+          </a:prstGeom>
+        </p:spPr>
+        <p:txBody>
+          <a:bodyPr anchorCtr="0" anchor="t" bIns="91425" lIns="91425" spcFirstLastPara="1" rIns="91425" wrap="square" tIns="91425">
+            <a:noAutofit/>
+          </a:bodyPr>
+          <a:lstStyle/>
+          <a:p>
             <a:pPr indent="0" lvl="0" marL="0" rtl="0" algn="l">
               <a:spcBef>
                 <a:spcPts val="0"/>
@@ -10168,7 +10201,7 @@
       </p:sp>
       <p:sp>
         <p:nvSpPr>
-          <p:cNvPr id="178" name="Google Shape;178;p28"/>
+          <p:cNvPr id="183" name="Google Shape;183;p28"/>
           <p:cNvSpPr txBox="1"/>
           <p:nvPr/>
         </p:nvSpPr>
@@ -10266,7 +10299,7 @@
       </p:sp>
       <p:pic>
         <p:nvPicPr>
-          <p:cNvPr id="179" name="Google Shape;179;p28"/>
+          <p:cNvPr id="184" name="Google Shape;184;p28"/>
           <p:cNvPicPr preferRelativeResize="0"/>
           <p:nvPr/>
         </p:nvPicPr>
@@ -10305,7 +10338,7 @@
   <p:cSld>
     <p:spTree>
       <p:nvGrpSpPr>
-        <p:cNvPr id="183" name="Shape 183"/>
+        <p:cNvPr id="188" name="Shape 188"/>
         <p:cNvGrpSpPr/>
         <p:nvPr/>
       </p:nvGrpSpPr>
@@ -10319,7 +10352,7 @@
       </p:grpSpPr>
       <p:sp>
         <p:nvSpPr>
-          <p:cNvPr id="184" name="Google Shape;184;p29"/>
+          <p:cNvPr id="189" name="Google Shape;189;p29"/>
           <p:cNvSpPr txBox="1"/>
           <p:nvPr>
             <p:ph type="title"/>
@@ -10359,7 +10392,7 @@
       </p:sp>
       <p:sp>
         <p:nvSpPr>
-          <p:cNvPr id="185" name="Google Shape;185;p29"/>
+          <p:cNvPr id="190" name="Google Shape;190;p29"/>
           <p:cNvSpPr txBox="1"/>
           <p:nvPr/>
         </p:nvSpPr>
@@ -10466,61 +10499,6 @@
               <a:ea typeface="Lato"/>
               <a:cs typeface="Lato"/>
               <a:sym typeface="Lato"/>
-            </a:endParaRPr>
-          </a:p>
-        </p:txBody>
-      </p:sp>
-      <p:sp>
-        <p:nvSpPr>
-          <p:cNvPr id="186" name="Google Shape;186;p29"/>
-          <p:cNvSpPr txBox="1"/>
-          <p:nvPr/>
-        </p:nvSpPr>
-        <p:spPr>
-          <a:xfrm>
-            <a:off x="861750" y="3923200"/>
-            <a:ext cx="7420500" cy="1054200"/>
-          </a:xfrm>
-          <a:prstGeom prst="rect">
-            <a:avLst/>
-          </a:prstGeom>
-          <a:noFill/>
-          <a:ln>
-            <a:noFill/>
-          </a:ln>
-        </p:spPr>
-        <p:txBody>
-          <a:bodyPr anchorCtr="0" anchor="t" bIns="91425" lIns="91425" spcFirstLastPara="1" rIns="91425" wrap="square" tIns="91425">
-            <a:noAutofit/>
-          </a:bodyPr>
-          <a:lstStyle/>
-          <a:p>
-            <a:pPr indent="0" lvl="0" marL="0" rtl="0" algn="ctr">
-              <a:lnSpc>
-                <a:spcPct val="115000"/>
-              </a:lnSpc>
-              <a:spcBef>
-                <a:spcPts val="0"/>
-              </a:spcBef>
-              <a:spcAft>
-                <a:spcPts val="0"/>
-              </a:spcAft>
-              <a:buNone/>
-            </a:pPr>
-            <a:r>
-              <a:rPr lang="en" sz="1600">
-                <a:latin typeface="Playfair Display"/>
-                <a:ea typeface="Playfair Display"/>
-                <a:cs typeface="Playfair Display"/>
-                <a:sym typeface="Playfair Display"/>
-              </a:rPr>
-              <a:t>In conclusion, if you decided to reside or visit a city with a high percentage population of millennials expect your next avocado toast to be pricer.</a:t>
-            </a:r>
-            <a:endParaRPr sz="1600">
-              <a:latin typeface="Playfair Display"/>
-              <a:ea typeface="Playfair Display"/>
-              <a:cs typeface="Playfair Display"/>
-              <a:sym typeface="Playfair Display"/>
             </a:endParaRPr>
           </a:p>
         </p:txBody>
@@ -10538,7 +10516,7 @@
   <p:cSld>
     <p:spTree>
       <p:nvGrpSpPr>
-        <p:cNvPr id="190" name="Shape 190"/>
+        <p:cNvPr id="194" name="Shape 194"/>
         <p:cNvGrpSpPr/>
         <p:nvPr/>
       </p:nvGrpSpPr>
@@ -10552,7 +10530,7 @@
       </p:grpSpPr>
       <p:sp>
         <p:nvSpPr>
-          <p:cNvPr id="191" name="Google Shape;191;p30"/>
+          <p:cNvPr id="195" name="Google Shape;195;p30"/>
           <p:cNvSpPr txBox="1"/>
           <p:nvPr>
             <p:ph type="title"/>
@@ -10560,6 +10538,261 @@
         </p:nvSpPr>
         <p:spPr>
           <a:xfrm>
+            <a:off x="311700" y="391350"/>
+            <a:ext cx="8520600" cy="626100"/>
+          </a:xfrm>
+          <a:prstGeom prst="rect">
+            <a:avLst/>
+          </a:prstGeom>
+        </p:spPr>
+        <p:txBody>
+          <a:bodyPr anchorCtr="0" anchor="t" bIns="91425" lIns="91425" spcFirstLastPara="1" rIns="91425" wrap="square" tIns="91425">
+            <a:noAutofit/>
+          </a:bodyPr>
+          <a:lstStyle/>
+          <a:p>
+            <a:pPr indent="0" lvl="0" marL="0" rtl="0" algn="ctr">
+              <a:spcBef>
+                <a:spcPts val="0"/>
+              </a:spcBef>
+              <a:spcAft>
+                <a:spcPts val="0"/>
+              </a:spcAft>
+              <a:buNone/>
+            </a:pPr>
+            <a:r>
+              <a:rPr lang="en" sz="4000"/>
+              <a:t>Other </a:t>
+            </a:r>
+            <a:r>
+              <a:rPr lang="en" sz="4000"/>
+              <a:t>Considerations</a:t>
+            </a:r>
+            <a:endParaRPr sz="4000"/>
+          </a:p>
+        </p:txBody>
+      </p:sp>
+      <p:sp>
+        <p:nvSpPr>
+          <p:cNvPr id="196" name="Google Shape;196;p30"/>
+          <p:cNvSpPr txBox="1"/>
+          <p:nvPr/>
+        </p:nvSpPr>
+        <p:spPr>
+          <a:xfrm>
+            <a:off x="699475" y="1378700"/>
+            <a:ext cx="6994800" cy="2311500"/>
+          </a:xfrm>
+          <a:prstGeom prst="rect">
+            <a:avLst/>
+          </a:prstGeom>
+          <a:noFill/>
+          <a:ln>
+            <a:noFill/>
+          </a:ln>
+        </p:spPr>
+        <p:txBody>
+          <a:bodyPr anchorCtr="0" anchor="t" bIns="91425" lIns="91425" spcFirstLastPara="1" rIns="91425" wrap="square" tIns="91425">
+            <a:noAutofit/>
+          </a:bodyPr>
+          <a:lstStyle/>
+          <a:p>
+            <a:pPr indent="-355600" lvl="0" marL="457200" rtl="0" algn="l">
+              <a:lnSpc>
+                <a:spcPct val="115000"/>
+              </a:lnSpc>
+              <a:spcBef>
+                <a:spcPts val="0"/>
+              </a:spcBef>
+              <a:spcAft>
+                <a:spcPts val="0"/>
+              </a:spcAft>
+              <a:buSzPts val="2000"/>
+              <a:buFont typeface="Lato"/>
+              <a:buChar char="●"/>
+            </a:pPr>
+            <a:r>
+              <a:rPr lang="en" sz="2000">
+                <a:latin typeface="Lato"/>
+                <a:ea typeface="Lato"/>
+                <a:cs typeface="Lato"/>
+                <a:sym typeface="Lato"/>
+              </a:rPr>
+              <a:t>Distance from Harvest to purchase location</a:t>
+            </a:r>
+            <a:endParaRPr sz="2000">
+              <a:latin typeface="Lato"/>
+              <a:ea typeface="Lato"/>
+              <a:cs typeface="Lato"/>
+              <a:sym typeface="Lato"/>
+            </a:endParaRPr>
+          </a:p>
+          <a:p>
+            <a:pPr indent="-355600" lvl="0" marL="457200" rtl="0" algn="l">
+              <a:lnSpc>
+                <a:spcPct val="115000"/>
+              </a:lnSpc>
+              <a:spcBef>
+                <a:spcPts val="0"/>
+              </a:spcBef>
+              <a:spcAft>
+                <a:spcPts val="0"/>
+              </a:spcAft>
+              <a:buSzPts val="2000"/>
+              <a:buFont typeface="Lato"/>
+              <a:buChar char="●"/>
+            </a:pPr>
+            <a:r>
+              <a:rPr lang="en" sz="2000">
+                <a:latin typeface="Lato"/>
+                <a:ea typeface="Lato"/>
+                <a:cs typeface="Lato"/>
+                <a:sym typeface="Lato"/>
+              </a:rPr>
+              <a:t>Harvest </a:t>
+            </a:r>
+            <a:r>
+              <a:rPr lang="en" sz="2000">
+                <a:latin typeface="Lato"/>
+                <a:ea typeface="Lato"/>
+                <a:cs typeface="Lato"/>
+                <a:sym typeface="Lato"/>
+              </a:rPr>
+              <a:t>yield</a:t>
+            </a:r>
+            <a:r>
+              <a:rPr lang="en" sz="2000">
+                <a:latin typeface="Lato"/>
+                <a:ea typeface="Lato"/>
+                <a:cs typeface="Lato"/>
+                <a:sym typeface="Lato"/>
+              </a:rPr>
+              <a:t> on any given year</a:t>
+            </a:r>
+            <a:endParaRPr sz="2000">
+              <a:latin typeface="Lato"/>
+              <a:ea typeface="Lato"/>
+              <a:cs typeface="Lato"/>
+              <a:sym typeface="Lato"/>
+            </a:endParaRPr>
+          </a:p>
+          <a:p>
+            <a:pPr indent="-355600" lvl="0" marL="457200" rtl="0" algn="l">
+              <a:lnSpc>
+                <a:spcPct val="115000"/>
+              </a:lnSpc>
+              <a:spcBef>
+                <a:spcPts val="0"/>
+              </a:spcBef>
+              <a:spcAft>
+                <a:spcPts val="0"/>
+              </a:spcAft>
+              <a:buSzPts val="2000"/>
+              <a:buFont typeface="Lato"/>
+              <a:buChar char="●"/>
+            </a:pPr>
+            <a:r>
+              <a:rPr lang="en" sz="2000">
+                <a:latin typeface="Lato"/>
+                <a:ea typeface="Lato"/>
+                <a:cs typeface="Lato"/>
+                <a:sym typeface="Lato"/>
+              </a:rPr>
+              <a:t>Time of year and </a:t>
+            </a:r>
+            <a:r>
+              <a:rPr lang="en" sz="2000">
+                <a:latin typeface="Lato"/>
+                <a:ea typeface="Lato"/>
+                <a:cs typeface="Lato"/>
+                <a:sym typeface="Lato"/>
+              </a:rPr>
+              <a:t>availability</a:t>
+            </a:r>
+            <a:r>
+              <a:rPr lang="en" sz="2000">
+                <a:latin typeface="Lato"/>
+                <a:ea typeface="Lato"/>
+                <a:cs typeface="Lato"/>
+                <a:sym typeface="Lato"/>
+              </a:rPr>
+              <a:t> of Avocados</a:t>
+            </a:r>
+            <a:endParaRPr sz="2000">
+              <a:latin typeface="Lato"/>
+              <a:ea typeface="Lato"/>
+              <a:cs typeface="Lato"/>
+              <a:sym typeface="Lato"/>
+            </a:endParaRPr>
+          </a:p>
+          <a:p>
+            <a:pPr indent="-355600" lvl="0" marL="457200" rtl="0" algn="l">
+              <a:lnSpc>
+                <a:spcPct val="115000"/>
+              </a:lnSpc>
+              <a:spcBef>
+                <a:spcPts val="0"/>
+              </a:spcBef>
+              <a:spcAft>
+                <a:spcPts val="0"/>
+              </a:spcAft>
+              <a:buSzPts val="2000"/>
+              <a:buFont typeface="Lato"/>
+              <a:buChar char="●"/>
+            </a:pPr>
+            <a:r>
+              <a:rPr lang="en" sz="2000">
+                <a:latin typeface="Lato"/>
+                <a:ea typeface="Lato"/>
+                <a:cs typeface="Lato"/>
+                <a:sym typeface="Lato"/>
+              </a:rPr>
+              <a:t>Many other factors</a:t>
+            </a:r>
+            <a:endParaRPr sz="2000">
+              <a:latin typeface="Lato"/>
+              <a:ea typeface="Lato"/>
+              <a:cs typeface="Lato"/>
+              <a:sym typeface="Lato"/>
+            </a:endParaRPr>
+          </a:p>
+        </p:txBody>
+      </p:sp>
+    </p:spTree>
+  </p:cSld>
+  <p:clrMapOvr>
+    <a:masterClrMapping/>
+  </p:clrMapOvr>
+</p:sld>
+</file>
+
+<file path=ppt/slides/slide19.xml><?xml version="1.0" encoding="utf-8"?>
+<p:sld xmlns:a="http://schemas.openxmlformats.org/drawingml/2006/main" xmlns:r="http://schemas.openxmlformats.org/officeDocument/2006/relationships" xmlns:mc="http://schemas.openxmlformats.org/markup-compatibility/2006" xmlns:mv="urn:schemas-microsoft-com:mac:vml" xmlns:p="http://schemas.openxmlformats.org/presentationml/2006/main" xmlns:c="http://schemas.openxmlformats.org/drawingml/2006/chart" xmlns:dgm="http://schemas.openxmlformats.org/drawingml/2006/diagram" xmlns:o="urn:schemas-microsoft-com:office:office" xmlns:v="urn:schemas-microsoft-com:vml" xmlns:pvml="urn:schemas-microsoft-com:office:powerpoint" xmlns:com="http://schemas.openxmlformats.org/drawingml/2006/compatibility" xmlns:p14="http://schemas.microsoft.com/office/powerpoint/2010/main" xmlns:p15="http://schemas.microsoft.com/office/powerpoint/2012/main" xmlns:ahyp="http://schemas.microsoft.com/office/drawing/2018/hyperlinkcolor">
+  <p:cSld>
+    <p:spTree>
+      <p:nvGrpSpPr>
+        <p:cNvPr id="200" name="Shape 200"/>
+        <p:cNvGrpSpPr/>
+        <p:nvPr/>
+      </p:nvGrpSpPr>
+      <p:grpSpPr>
+        <a:xfrm>
+          <a:off x="0" y="0"/>
+          <a:ext cx="0" cy="0"/>
+          <a:chOff x="0" y="0"/>
+          <a:chExt cx="0" cy="0"/>
+        </a:xfrm>
+      </p:grpSpPr>
+      <p:sp>
+        <p:nvSpPr>
+          <p:cNvPr id="201" name="Google Shape;201;p31"/>
+          <p:cNvSpPr txBox="1"/>
+          <p:nvPr>
+            <p:ph type="title"/>
+          </p:nvPr>
+        </p:nvSpPr>
+        <p:spPr>
+          <a:xfrm>
             <a:off x="5089600" y="2218500"/>
             <a:ext cx="3236100" cy="706500"/>
           </a:xfrm>
@@ -10592,7 +10825,7 @@
       </p:sp>
       <p:sp>
         <p:nvSpPr>
-          <p:cNvPr id="192" name="Google Shape;192;p30"/>
+          <p:cNvPr id="202" name="Google Shape;202;p31"/>
           <p:cNvSpPr txBox="1"/>
           <p:nvPr>
             <p:ph idx="1" type="body"/>
@@ -10646,7 +10879,7 @@
       </p:sp>
       <p:pic>
         <p:nvPicPr>
-          <p:cNvPr id="193" name="Google Shape;193;p30"/>
+          <p:cNvPr id="203" name="Google Shape;203;p31"/>
           <p:cNvPicPr preferRelativeResize="0"/>
           <p:nvPr/>
         </p:nvPicPr>
@@ -11600,8 +11833,35 @@
         </p:blipFill>
         <p:spPr>
           <a:xfrm>
-            <a:off x="1504850" y="806900"/>
+            <a:off x="403425" y="891825"/>
             <a:ext cx="5754224" cy="3958873"/>
+          </a:xfrm>
+          <a:prstGeom prst="rect">
+            <a:avLst/>
+          </a:prstGeom>
+          <a:noFill/>
+          <a:ln>
+            <a:noFill/>
+          </a:ln>
+        </p:spPr>
+      </p:pic>
+      <p:pic>
+        <p:nvPicPr>
+          <p:cNvPr id="89" name="Google Shape;89;p16"/>
+          <p:cNvPicPr preferRelativeResize="0"/>
+          <p:nvPr/>
+        </p:nvPicPr>
+        <p:blipFill rotWithShape="1">
+          <a:blip r:embed="rId4">
+            <a:alphaModFix/>
+          </a:blip>
+          <a:srcRect b="0" l="0" r="28299" t="0"/>
+          <a:stretch/>
+        </p:blipFill>
+        <p:spPr>
+          <a:xfrm>
+            <a:off x="6436425" y="891825"/>
+            <a:ext cx="2346017" cy="3958874"/>
           </a:xfrm>
           <a:prstGeom prst="rect">
             <a:avLst/>
@@ -11625,7 +11885,7 @@
   <p:cSld>
     <p:spTree>
       <p:nvGrpSpPr>
-        <p:cNvPr id="92" name="Shape 92"/>
+        <p:cNvPr id="93" name="Shape 93"/>
         <p:cNvGrpSpPr/>
         <p:nvPr/>
       </p:nvGrpSpPr>
@@ -11639,7 +11899,7 @@
       </p:grpSpPr>
       <p:sp>
         <p:nvSpPr>
-          <p:cNvPr id="93" name="Google Shape;93;p17"/>
+          <p:cNvPr id="94" name="Google Shape;94;p17"/>
           <p:cNvSpPr txBox="1"/>
           <p:nvPr>
             <p:ph type="title"/>
@@ -11674,92 +11934,6 @@
               <a:t>Avocado data</a:t>
             </a:r>
             <a:endParaRPr sz="2700"/>
-          </a:p>
-        </p:txBody>
-      </p:sp>
-      <p:sp>
-        <p:nvSpPr>
-          <p:cNvPr id="94" name="Google Shape;94;p17"/>
-          <p:cNvSpPr txBox="1"/>
-          <p:nvPr>
-            <p:ph idx="1" type="subTitle"/>
-          </p:nvPr>
-        </p:nvSpPr>
-        <p:spPr>
-          <a:xfrm>
-            <a:off x="351000" y="738201"/>
-            <a:ext cx="4045200" cy="1345500"/>
-          </a:xfrm>
-          <a:prstGeom prst="rect">
-            <a:avLst/>
-          </a:prstGeom>
-        </p:spPr>
-        <p:txBody>
-          <a:bodyPr anchorCtr="0" anchor="t" bIns="91425" lIns="91425" spcFirstLastPara="1" rIns="91425" wrap="square" tIns="91425">
-            <a:noAutofit/>
-          </a:bodyPr>
-          <a:lstStyle/>
-          <a:p>
-            <a:pPr indent="0" lvl="0" marL="0" rtl="0" algn="ctr">
-              <a:spcBef>
-                <a:spcPts val="0"/>
-              </a:spcBef>
-              <a:spcAft>
-                <a:spcPts val="0"/>
-              </a:spcAft>
-              <a:buNone/>
-            </a:pPr>
-            <a:r>
-              <a:rPr lang="en"/>
-              <a:t>13 columns, 18722 Rows</a:t>
-            </a:r>
-            <a:endParaRPr/>
-          </a:p>
-          <a:p>
-            <a:pPr indent="0" lvl="0" marL="0" rtl="0" algn="ctr">
-              <a:spcBef>
-                <a:spcPts val="0"/>
-              </a:spcBef>
-              <a:spcAft>
-                <a:spcPts val="0"/>
-              </a:spcAft>
-              <a:buNone/>
-            </a:pPr>
-            <a:r>
-              <a:t/>
-            </a:r>
-            <a:endParaRPr/>
-          </a:p>
-          <a:p>
-            <a:pPr indent="0" lvl="0" marL="0" rtl="0" algn="ctr">
-              <a:spcBef>
-                <a:spcPts val="0"/>
-              </a:spcBef>
-              <a:spcAft>
-                <a:spcPts val="0"/>
-              </a:spcAft>
-              <a:buNone/>
-            </a:pPr>
-            <a:r>
-              <a:rPr lang="en"/>
-              <a:t>Average Price</a:t>
-            </a:r>
-            <a:endParaRPr/>
-          </a:p>
-          <a:p>
-            <a:pPr indent="0" lvl="0" marL="0" rtl="0" algn="ctr">
-              <a:spcBef>
-                <a:spcPts val="0"/>
-              </a:spcBef>
-              <a:spcAft>
-                <a:spcPts val="0"/>
-              </a:spcAft>
-              <a:buNone/>
-            </a:pPr>
-            <a:r>
-              <a:t/>
-            </a:r>
-            <a:endParaRPr/>
           </a:p>
         </p:txBody>
       </p:sp>
@@ -11767,20 +11941,18 @@
         <p:nvSpPr>
           <p:cNvPr id="95" name="Google Shape;95;p17"/>
           <p:cNvSpPr txBox="1"/>
-          <p:nvPr/>
+          <p:nvPr>
+            <p:ph idx="1" type="subTitle"/>
+          </p:nvPr>
         </p:nvSpPr>
         <p:spPr>
           <a:xfrm>
-            <a:off x="4812625" y="3229350"/>
-            <a:ext cx="4123800" cy="1037100"/>
+            <a:off x="351000" y="738200"/>
+            <a:ext cx="4045200" cy="793800"/>
           </a:xfrm>
           <a:prstGeom prst="rect">
             <a:avLst/>
           </a:prstGeom>
-          <a:noFill/>
-          <a:ln>
-            <a:noFill/>
-          </a:ln>
         </p:spPr>
         <p:txBody>
           <a:bodyPr anchorCtr="0" anchor="t" bIns="91425" lIns="91425" spcFirstLastPara="1" rIns="91425" wrap="square" tIns="91425">
@@ -11788,33 +11960,39 @@
           </a:bodyPr>
           <a:lstStyle/>
           <a:p>
-            <a:pPr indent="0" lvl="0" marL="0" rtl="0" algn="l">
-              <a:spcBef>
-                <a:spcPts val="0"/>
-              </a:spcBef>
-              <a:spcAft>
-                <a:spcPts val="0"/>
-              </a:spcAft>
-              <a:buNone/>
-            </a:pPr>
-            <a:r>
-              <a:rPr lang="en" sz="600">
-                <a:latin typeface="Lato"/>
-                <a:ea typeface="Lato"/>
-                <a:cs typeface="Lato"/>
-                <a:sym typeface="Lato"/>
-              </a:rPr>
-              <a:t>Normal Test results for 2015 are statistic=3.165418348345291 with a pvalue=0.2054178309964272)</a:t>
-            </a:r>
-            <a:endParaRPr sz="600">
-              <a:latin typeface="Lato"/>
-              <a:ea typeface="Lato"/>
-              <a:cs typeface="Lato"/>
-              <a:sym typeface="Lato"/>
-            </a:endParaRPr>
-          </a:p>
-          <a:p>
-            <a:pPr indent="0" lvl="0" marL="0" rtl="0" algn="l">
+            <a:pPr indent="0" lvl="0" marL="0" rtl="0" algn="ctr">
+              <a:spcBef>
+                <a:spcPts val="0"/>
+              </a:spcBef>
+              <a:spcAft>
+                <a:spcPts val="0"/>
+              </a:spcAft>
+              <a:buNone/>
+            </a:pPr>
+            <a:r>
+              <a:rPr lang="en"/>
+              <a:t>13 columns, 18722 Rows</a:t>
+            </a:r>
+            <a:endParaRPr/>
+          </a:p>
+          <a:p>
+            <a:pPr indent="0" lvl="0" marL="0" rtl="0" algn="ctr">
+              <a:spcBef>
+                <a:spcPts val="0"/>
+              </a:spcBef>
+              <a:spcAft>
+                <a:spcPts val="0"/>
+              </a:spcAft>
+              <a:buNone/>
+            </a:pPr>
+            <a:r>
+              <a:rPr lang="en"/>
+              <a:t>Average Price</a:t>
+            </a:r>
+            <a:endParaRPr/>
+          </a:p>
+          <a:p>
+            <a:pPr indent="0" lvl="0" marL="0" rtl="0" algn="ctr">
               <a:spcBef>
                 <a:spcPts val="0"/>
               </a:spcBef>
@@ -11826,150 +12004,7 @@
             <a:r>
               <a:t/>
             </a:r>
-            <a:endParaRPr sz="600">
-              <a:latin typeface="Lato"/>
-              <a:ea typeface="Lato"/>
-              <a:cs typeface="Lato"/>
-              <a:sym typeface="Lato"/>
-            </a:endParaRPr>
-          </a:p>
-          <a:p>
-            <a:pPr indent="0" lvl="0" marL="0" rtl="0" algn="l">
-              <a:spcBef>
-                <a:spcPts val="0"/>
-              </a:spcBef>
-              <a:spcAft>
-                <a:spcPts val="0"/>
-              </a:spcAft>
-              <a:buNone/>
-            </a:pPr>
-            <a:r>
-              <a:rPr lang="en" sz="600">
-                <a:latin typeface="Lato"/>
-                <a:ea typeface="Lato"/>
-                <a:cs typeface="Lato"/>
-                <a:sym typeface="Lato"/>
-              </a:rPr>
-              <a:t>Normal Test results for 2016 are statistic=4.917488597178161 with a  pvalue=0.08554229914031346)</a:t>
-            </a:r>
-            <a:endParaRPr sz="600">
-              <a:latin typeface="Lato"/>
-              <a:ea typeface="Lato"/>
-              <a:cs typeface="Lato"/>
-              <a:sym typeface="Lato"/>
-            </a:endParaRPr>
-          </a:p>
-          <a:p>
-            <a:pPr indent="0" lvl="0" marL="0" rtl="0" algn="l">
-              <a:spcBef>
-                <a:spcPts val="0"/>
-              </a:spcBef>
-              <a:spcAft>
-                <a:spcPts val="0"/>
-              </a:spcAft>
-              <a:buNone/>
-            </a:pPr>
-            <a:r>
-              <a:t/>
-            </a:r>
-            <a:endParaRPr sz="600">
-              <a:latin typeface="Lato"/>
-              <a:ea typeface="Lato"/>
-              <a:cs typeface="Lato"/>
-              <a:sym typeface="Lato"/>
-            </a:endParaRPr>
-          </a:p>
-          <a:p>
-            <a:pPr indent="0" lvl="0" marL="0" rtl="0" algn="l">
-              <a:spcBef>
-                <a:spcPts val="0"/>
-              </a:spcBef>
-              <a:spcAft>
-                <a:spcPts val="0"/>
-              </a:spcAft>
-              <a:buNone/>
-            </a:pPr>
-            <a:r>
-              <a:rPr lang="en" sz="600">
-                <a:latin typeface="Lato"/>
-                <a:ea typeface="Lato"/>
-                <a:cs typeface="Lato"/>
-                <a:sym typeface="Lato"/>
-              </a:rPr>
-              <a:t>Normal Test results for 2017 are statistic=8.92214851212411, with a  pvalue=0.011549949017861348)</a:t>
-            </a:r>
-            <a:endParaRPr sz="600">
-              <a:latin typeface="Lato"/>
-              <a:ea typeface="Lato"/>
-              <a:cs typeface="Lato"/>
-              <a:sym typeface="Lato"/>
-            </a:endParaRPr>
-          </a:p>
-          <a:p>
-            <a:pPr indent="0" lvl="0" marL="0" rtl="0" algn="l">
-              <a:spcBef>
-                <a:spcPts val="0"/>
-              </a:spcBef>
-              <a:spcAft>
-                <a:spcPts val="0"/>
-              </a:spcAft>
-              <a:buNone/>
-            </a:pPr>
-            <a:r>
-              <a:t/>
-            </a:r>
-            <a:endParaRPr sz="600">
-              <a:latin typeface="Lato"/>
-              <a:ea typeface="Lato"/>
-              <a:cs typeface="Lato"/>
-              <a:sym typeface="Lato"/>
-            </a:endParaRPr>
-          </a:p>
-          <a:p>
-            <a:pPr indent="0" lvl="0" marL="0" rtl="0" algn="l">
-              <a:spcBef>
-                <a:spcPts val="0"/>
-              </a:spcBef>
-              <a:spcAft>
-                <a:spcPts val="0"/>
-              </a:spcAft>
-              <a:buNone/>
-            </a:pPr>
-            <a:r>
-              <a:rPr lang="en" sz="600">
-                <a:latin typeface="Lato"/>
-                <a:ea typeface="Lato"/>
-                <a:cs typeface="Lato"/>
-                <a:sym typeface="Lato"/>
-              </a:rPr>
-              <a:t>Normal Test results for 2018 are  statistic=1.8896928899913943,  with a  pvalue=0.3887392591775346)</a:t>
-            </a:r>
-            <a:endParaRPr sz="600">
-              <a:latin typeface="Lato"/>
-              <a:ea typeface="Lato"/>
-              <a:cs typeface="Lato"/>
-              <a:sym typeface="Lato"/>
-            </a:endParaRPr>
-          </a:p>
-          <a:p>
-            <a:pPr indent="0" lvl="0" marL="0" rtl="0" algn="l">
-              <a:spcBef>
-                <a:spcPts val="0"/>
-              </a:spcBef>
-              <a:spcAft>
-                <a:spcPts val="0"/>
-              </a:spcAft>
-              <a:buNone/>
-            </a:pPr>
-            <a:r>
-              <a:t/>
-            </a:r>
-            <a:endParaRPr sz="600">
-              <a:latin typeface="Lato"/>
-              <a:ea typeface="Lato"/>
-              <a:cs typeface="Lato"/>
-              <a:sym typeface="Lato"/>
-            </a:endParaRPr>
+            <a:endParaRPr/>
           </a:p>
         </p:txBody>
       </p:sp>
@@ -11981,7 +12016,217 @@
         </p:nvSpPr>
         <p:spPr>
           <a:xfrm>
-            <a:off x="320575" y="2336650"/>
+            <a:off x="4812638" y="3674925"/>
+            <a:ext cx="4123800" cy="1037100"/>
+          </a:xfrm>
+          <a:prstGeom prst="rect">
+            <a:avLst/>
+          </a:prstGeom>
+          <a:noFill/>
+          <a:ln>
+            <a:noFill/>
+          </a:ln>
+        </p:spPr>
+        <p:txBody>
+          <a:bodyPr anchorCtr="0" anchor="t" bIns="91425" lIns="91425" spcFirstLastPara="1" rIns="91425" wrap="square" tIns="91425">
+            <a:noAutofit/>
+          </a:bodyPr>
+          <a:lstStyle/>
+          <a:p>
+            <a:pPr indent="0" lvl="0" marL="0" rtl="0" algn="l">
+              <a:spcBef>
+                <a:spcPts val="0"/>
+              </a:spcBef>
+              <a:spcAft>
+                <a:spcPts val="0"/>
+              </a:spcAft>
+              <a:buNone/>
+            </a:pPr>
+            <a:r>
+              <a:rPr lang="en" sz="600">
+                <a:latin typeface="Lato"/>
+                <a:ea typeface="Lato"/>
+                <a:cs typeface="Lato"/>
+                <a:sym typeface="Lato"/>
+              </a:rPr>
+              <a:t>Normal Test results for 2015 are statistic=3.165418348345291 with a pvalue=0.2054178309964272)</a:t>
+            </a:r>
+            <a:endParaRPr sz="600">
+              <a:latin typeface="Lato"/>
+              <a:ea typeface="Lato"/>
+              <a:cs typeface="Lato"/>
+              <a:sym typeface="Lato"/>
+            </a:endParaRPr>
+          </a:p>
+          <a:p>
+            <a:pPr indent="0" lvl="0" marL="0" rtl="0" algn="l">
+              <a:spcBef>
+                <a:spcPts val="0"/>
+              </a:spcBef>
+              <a:spcAft>
+                <a:spcPts val="0"/>
+              </a:spcAft>
+              <a:buNone/>
+            </a:pPr>
+            <a:r>
+              <a:t/>
+            </a:r>
+            <a:endParaRPr sz="600">
+              <a:latin typeface="Lato"/>
+              <a:ea typeface="Lato"/>
+              <a:cs typeface="Lato"/>
+              <a:sym typeface="Lato"/>
+            </a:endParaRPr>
+          </a:p>
+          <a:p>
+            <a:pPr indent="0" lvl="0" marL="0" rtl="0" algn="l">
+              <a:spcBef>
+                <a:spcPts val="0"/>
+              </a:spcBef>
+              <a:spcAft>
+                <a:spcPts val="0"/>
+              </a:spcAft>
+              <a:buNone/>
+            </a:pPr>
+            <a:r>
+              <a:rPr lang="en" sz="600">
+                <a:latin typeface="Lato"/>
+                <a:ea typeface="Lato"/>
+                <a:cs typeface="Lato"/>
+                <a:sym typeface="Lato"/>
+              </a:rPr>
+              <a:t>Normal Test results for 2016 are statistic=4.917488597178161 with a  pvalue=0.08554229914031346)</a:t>
+            </a:r>
+            <a:endParaRPr sz="600">
+              <a:latin typeface="Lato"/>
+              <a:ea typeface="Lato"/>
+              <a:cs typeface="Lato"/>
+              <a:sym typeface="Lato"/>
+            </a:endParaRPr>
+          </a:p>
+          <a:p>
+            <a:pPr indent="0" lvl="0" marL="0" rtl="0" algn="l">
+              <a:spcBef>
+                <a:spcPts val="0"/>
+              </a:spcBef>
+              <a:spcAft>
+                <a:spcPts val="0"/>
+              </a:spcAft>
+              <a:buNone/>
+            </a:pPr>
+            <a:r>
+              <a:t/>
+            </a:r>
+            <a:endParaRPr sz="600">
+              <a:latin typeface="Lato"/>
+              <a:ea typeface="Lato"/>
+              <a:cs typeface="Lato"/>
+              <a:sym typeface="Lato"/>
+            </a:endParaRPr>
+          </a:p>
+          <a:p>
+            <a:pPr indent="0" lvl="0" marL="0" rtl="0" algn="l">
+              <a:spcBef>
+                <a:spcPts val="0"/>
+              </a:spcBef>
+              <a:spcAft>
+                <a:spcPts val="0"/>
+              </a:spcAft>
+              <a:buNone/>
+            </a:pPr>
+            <a:r>
+              <a:rPr lang="en" sz="600">
+                <a:latin typeface="Lato"/>
+                <a:ea typeface="Lato"/>
+                <a:cs typeface="Lato"/>
+                <a:sym typeface="Lato"/>
+              </a:rPr>
+              <a:t>Normal Test results for 2017 are statistic=8.92214851212411, with a  pvalue=0.011549949017861348)</a:t>
+            </a:r>
+            <a:endParaRPr sz="600">
+              <a:latin typeface="Lato"/>
+              <a:ea typeface="Lato"/>
+              <a:cs typeface="Lato"/>
+              <a:sym typeface="Lato"/>
+            </a:endParaRPr>
+          </a:p>
+          <a:p>
+            <a:pPr indent="0" lvl="0" marL="0" rtl="0" algn="l">
+              <a:spcBef>
+                <a:spcPts val="0"/>
+              </a:spcBef>
+              <a:spcAft>
+                <a:spcPts val="0"/>
+              </a:spcAft>
+              <a:buNone/>
+            </a:pPr>
+            <a:r>
+              <a:t/>
+            </a:r>
+            <a:endParaRPr sz="600">
+              <a:latin typeface="Lato"/>
+              <a:ea typeface="Lato"/>
+              <a:cs typeface="Lato"/>
+              <a:sym typeface="Lato"/>
+            </a:endParaRPr>
+          </a:p>
+          <a:p>
+            <a:pPr indent="0" lvl="0" marL="0" rtl="0" algn="l">
+              <a:spcBef>
+                <a:spcPts val="0"/>
+              </a:spcBef>
+              <a:spcAft>
+                <a:spcPts val="0"/>
+              </a:spcAft>
+              <a:buNone/>
+            </a:pPr>
+            <a:r>
+              <a:rPr lang="en" sz="600">
+                <a:latin typeface="Lato"/>
+                <a:ea typeface="Lato"/>
+                <a:cs typeface="Lato"/>
+                <a:sym typeface="Lato"/>
+              </a:rPr>
+              <a:t>Normal Test results for 2018 are  statistic=1.8896928899913943,  with a  pvalue=0.3887392591775346)</a:t>
+            </a:r>
+            <a:endParaRPr sz="600">
+              <a:latin typeface="Lato"/>
+              <a:ea typeface="Lato"/>
+              <a:cs typeface="Lato"/>
+              <a:sym typeface="Lato"/>
+            </a:endParaRPr>
+          </a:p>
+          <a:p>
+            <a:pPr indent="0" lvl="0" marL="0" rtl="0" algn="l">
+              <a:spcBef>
+                <a:spcPts val="0"/>
+              </a:spcBef>
+              <a:spcAft>
+                <a:spcPts val="0"/>
+              </a:spcAft>
+              <a:buNone/>
+            </a:pPr>
+            <a:r>
+              <a:t/>
+            </a:r>
+            <a:endParaRPr sz="600">
+              <a:latin typeface="Lato"/>
+              <a:ea typeface="Lato"/>
+              <a:cs typeface="Lato"/>
+              <a:sym typeface="Lato"/>
+            </a:endParaRPr>
+          </a:p>
+        </p:txBody>
+      </p:sp>
+      <p:sp>
+        <p:nvSpPr>
+          <p:cNvPr id="97" name="Google Shape;97;p17"/>
+          <p:cNvSpPr txBox="1"/>
+          <p:nvPr/>
+        </p:nvSpPr>
+        <p:spPr>
+          <a:xfrm>
+            <a:off x="382500" y="2335375"/>
             <a:ext cx="3811200" cy="2236800"/>
           </a:xfrm>
           <a:prstGeom prst="rect">
@@ -12181,7 +12426,7 @@
       </p:sp>
       <p:pic>
         <p:nvPicPr>
-          <p:cNvPr id="97" name="Google Shape;97;p17"/>
+          <p:cNvPr id="98" name="Google Shape;98;p17"/>
           <p:cNvPicPr preferRelativeResize="0"/>
           <p:nvPr/>
         </p:nvPicPr>
@@ -12195,7 +12440,7 @@
         </p:blipFill>
         <p:spPr>
           <a:xfrm>
-            <a:off x="4781663" y="670976"/>
+            <a:off x="4781675" y="1540751"/>
             <a:ext cx="4185726" cy="2062000"/>
           </a:xfrm>
           <a:prstGeom prst="rect">
@@ -12209,13 +12454,13 @@
       </p:pic>
       <p:sp>
         <p:nvSpPr>
-          <p:cNvPr id="98" name="Google Shape;98;p17"/>
+          <p:cNvPr id="99" name="Google Shape;99;p17"/>
           <p:cNvSpPr txBox="1"/>
           <p:nvPr/>
         </p:nvSpPr>
         <p:spPr>
           <a:xfrm>
-            <a:off x="8135575" y="2749675"/>
+            <a:off x="8038300" y="2335375"/>
             <a:ext cx="929100" cy="270900"/>
           </a:xfrm>
           <a:prstGeom prst="rect">
@@ -12299,13 +12544,13 @@
       </p:sp>
       <p:sp>
         <p:nvSpPr>
-          <p:cNvPr id="99" name="Google Shape;99;p17"/>
+          <p:cNvPr id="100" name="Google Shape;100;p17"/>
           <p:cNvSpPr txBox="1"/>
           <p:nvPr/>
         </p:nvSpPr>
         <p:spPr>
           <a:xfrm>
-            <a:off x="1578150" y="1949225"/>
+            <a:off x="1624500" y="2153275"/>
             <a:ext cx="1498200" cy="182100"/>
           </a:xfrm>
           <a:prstGeom prst="rect">
@@ -12355,6 +12600,34 @@
           </a:p>
         </p:txBody>
       </p:sp>
+      <p:pic>
+        <p:nvPicPr>
+          <p:cNvPr id="101" name="Google Shape;101;p17"/>
+          <p:cNvPicPr preferRelativeResize="0"/>
+          <p:nvPr/>
+        </p:nvPicPr>
+        <p:blipFill>
+          <a:blip r:embed="rId4">
+            <a:alphaModFix/>
+          </a:blip>
+          <a:stretch>
+            <a:fillRect/>
+          </a:stretch>
+        </p:blipFill>
+        <p:spPr>
+          <a:xfrm>
+            <a:off x="4812637" y="289175"/>
+            <a:ext cx="4123801" cy="1066527"/>
+          </a:xfrm>
+          <a:prstGeom prst="rect">
+            <a:avLst/>
+          </a:prstGeom>
+          <a:noFill/>
+          <a:ln>
+            <a:noFill/>
+          </a:ln>
+        </p:spPr>
+      </p:pic>
     </p:spTree>
   </p:cSld>
   <p:clrMapOvr>
@@ -12368,7 +12641,7 @@
   <p:cSld>
     <p:spTree>
       <p:nvGrpSpPr>
-        <p:cNvPr id="103" name="Shape 103"/>
+        <p:cNvPr id="105" name="Shape 105"/>
         <p:cNvGrpSpPr/>
         <p:nvPr/>
       </p:nvGrpSpPr>
@@ -12382,7 +12655,7 @@
       </p:grpSpPr>
       <p:sp>
         <p:nvSpPr>
-          <p:cNvPr id="104" name="Google Shape;104;p18"/>
+          <p:cNvPr id="106" name="Google Shape;106;p18"/>
           <p:cNvSpPr txBox="1"/>
           <p:nvPr>
             <p:ph type="title"/>
@@ -12422,7 +12695,7 @@
       </p:sp>
       <p:sp>
         <p:nvSpPr>
-          <p:cNvPr id="105" name="Google Shape;105;p18"/>
+          <p:cNvPr id="107" name="Google Shape;107;p18"/>
           <p:cNvSpPr txBox="1"/>
           <p:nvPr>
             <p:ph idx="1" type="subTitle"/>
@@ -12673,7 +12946,7 @@
       </p:sp>
       <p:pic>
         <p:nvPicPr>
-          <p:cNvPr id="106" name="Google Shape;106;p18"/>
+          <p:cNvPr id="108" name="Google Shape;108;p18"/>
           <p:cNvPicPr preferRelativeResize="0"/>
           <p:nvPr/>
         </p:nvPicPr>
@@ -12687,7 +12960,7 @@
         </p:blipFill>
         <p:spPr>
           <a:xfrm>
-            <a:off x="5065675" y="1354900"/>
+            <a:off x="5198575" y="224925"/>
             <a:ext cx="3598700" cy="2157196"/>
           </a:xfrm>
           <a:prstGeom prst="rect">
@@ -12699,6 +12972,166 @@
           </a:ln>
         </p:spPr>
       </p:pic>
+      <p:pic>
+        <p:nvPicPr>
+          <p:cNvPr id="109" name="Google Shape;109;p18"/>
+          <p:cNvPicPr preferRelativeResize="0"/>
+          <p:nvPr/>
+        </p:nvPicPr>
+        <p:blipFill>
+          <a:blip r:embed="rId4">
+            <a:alphaModFix/>
+          </a:blip>
+          <a:stretch>
+            <a:fillRect/>
+          </a:stretch>
+        </p:blipFill>
+        <p:spPr>
+          <a:xfrm>
+            <a:off x="5862662" y="2529800"/>
+            <a:ext cx="2270525" cy="977100"/>
+          </a:xfrm>
+          <a:prstGeom prst="rect">
+            <a:avLst/>
+          </a:prstGeom>
+          <a:noFill/>
+          <a:ln>
+            <a:noFill/>
+          </a:ln>
+        </p:spPr>
+      </p:pic>
+      <p:pic>
+        <p:nvPicPr>
+          <p:cNvPr id="110" name="Google Shape;110;p18"/>
+          <p:cNvPicPr preferRelativeResize="0"/>
+          <p:nvPr/>
+        </p:nvPicPr>
+        <p:blipFill>
+          <a:blip r:embed="rId5">
+            <a:alphaModFix/>
+          </a:blip>
+          <a:stretch>
+            <a:fillRect/>
+          </a:stretch>
+        </p:blipFill>
+        <p:spPr>
+          <a:xfrm>
+            <a:off x="5750971" y="3951775"/>
+            <a:ext cx="2493900" cy="705050"/>
+          </a:xfrm>
+          <a:prstGeom prst="rect">
+            <a:avLst/>
+          </a:prstGeom>
+          <a:noFill/>
+          <a:ln>
+            <a:noFill/>
+          </a:ln>
+        </p:spPr>
+      </p:pic>
+      <p:sp>
+        <p:nvSpPr>
+          <p:cNvPr id="111" name="Google Shape;111;p18"/>
+          <p:cNvSpPr txBox="1"/>
+          <p:nvPr/>
+        </p:nvSpPr>
+        <p:spPr>
+          <a:xfrm>
+            <a:off x="5862650" y="3506900"/>
+            <a:ext cx="2063700" cy="274200"/>
+          </a:xfrm>
+          <a:prstGeom prst="rect">
+            <a:avLst/>
+          </a:prstGeom>
+          <a:noFill/>
+          <a:ln>
+            <a:noFill/>
+          </a:ln>
+        </p:spPr>
+        <p:txBody>
+          <a:bodyPr anchorCtr="0" anchor="t" bIns="91425" lIns="91425" spcFirstLastPara="1" rIns="91425" wrap="square" tIns="91425">
+            <a:noAutofit/>
+          </a:bodyPr>
+          <a:lstStyle/>
+          <a:p>
+            <a:pPr indent="0" lvl="0" marL="0" rtl="0" algn="l">
+              <a:spcBef>
+                <a:spcPts val="0"/>
+              </a:spcBef>
+              <a:spcAft>
+                <a:spcPts val="0"/>
+              </a:spcAft>
+              <a:buNone/>
+            </a:pPr>
+            <a:r>
+              <a:rPr lang="en" sz="500">
+                <a:latin typeface="Lato"/>
+                <a:ea typeface="Lato"/>
+                <a:cs typeface="Lato"/>
+                <a:sym typeface="Lato"/>
+              </a:rPr>
+              <a:t>Median Income </a:t>
+            </a:r>
+            <a:endParaRPr sz="500">
+              <a:latin typeface="Lato"/>
+              <a:ea typeface="Lato"/>
+              <a:cs typeface="Lato"/>
+              <a:sym typeface="Lato"/>
+            </a:endParaRPr>
+          </a:p>
+        </p:txBody>
+      </p:sp>
+      <p:sp>
+        <p:nvSpPr>
+          <p:cNvPr id="112" name="Google Shape;112;p18"/>
+          <p:cNvSpPr txBox="1"/>
+          <p:nvPr/>
+        </p:nvSpPr>
+        <p:spPr>
+          <a:xfrm>
+            <a:off x="5750975" y="4656825"/>
+            <a:ext cx="2063700" cy="274200"/>
+          </a:xfrm>
+          <a:prstGeom prst="rect">
+            <a:avLst/>
+          </a:prstGeom>
+          <a:noFill/>
+          <a:ln>
+            <a:noFill/>
+          </a:ln>
+        </p:spPr>
+        <p:txBody>
+          <a:bodyPr anchorCtr="0" anchor="t" bIns="91425" lIns="91425" spcFirstLastPara="1" rIns="91425" wrap="square" tIns="91425">
+            <a:noAutofit/>
+          </a:bodyPr>
+          <a:lstStyle/>
+          <a:p>
+            <a:pPr indent="0" lvl="0" marL="0" rtl="0" algn="l">
+              <a:spcBef>
+                <a:spcPts val="0"/>
+              </a:spcBef>
+              <a:spcAft>
+                <a:spcPts val="0"/>
+              </a:spcAft>
+              <a:buNone/>
+            </a:pPr>
+            <a:r>
+              <a:rPr lang="en" sz="500">
+                <a:latin typeface="Lato"/>
+                <a:ea typeface="Lato"/>
+                <a:cs typeface="Lato"/>
+                <a:sym typeface="Lato"/>
+              </a:rPr>
+              <a:t>Age Group</a:t>
+            </a:r>
+            <a:endParaRPr sz="500">
+              <a:latin typeface="Lato"/>
+              <a:ea typeface="Lato"/>
+              <a:cs typeface="Lato"/>
+              <a:sym typeface="Lato"/>
+            </a:endParaRPr>
+          </a:p>
+        </p:txBody>
+      </p:sp>
     </p:spTree>
   </p:cSld>
   <p:clrMapOvr>
@@ -12712,7 +13145,7 @@
   <p:cSld>
     <p:spTree>
       <p:nvGrpSpPr>
-        <p:cNvPr id="110" name="Shape 110"/>
+        <p:cNvPr id="116" name="Shape 116"/>
         <p:cNvGrpSpPr/>
         <p:nvPr/>
       </p:nvGrpSpPr>
@@ -12726,7 +13159,7 @@
       </p:grpSpPr>
       <p:sp>
         <p:nvSpPr>
-          <p:cNvPr id="111" name="Google Shape;111;p19"/>
+          <p:cNvPr id="117" name="Google Shape;117;p19"/>
           <p:cNvSpPr txBox="1"/>
           <p:nvPr>
             <p:ph type="title"/>
@@ -12777,7 +13210,7 @@
   <p:cSld>
     <p:spTree>
       <p:nvGrpSpPr>
-        <p:cNvPr id="115" name="Shape 115"/>
+        <p:cNvPr id="121" name="Shape 121"/>
         <p:cNvGrpSpPr/>
         <p:nvPr/>
       </p:nvGrpSpPr>
@@ -12791,7 +13224,7 @@
       </p:grpSpPr>
       <p:sp>
         <p:nvSpPr>
-          <p:cNvPr id="116" name="Google Shape;116;p20"/>
+          <p:cNvPr id="122" name="Google Shape;122;p20"/>
           <p:cNvSpPr txBox="1"/>
           <p:nvPr>
             <p:ph idx="1" type="body"/>
@@ -12847,7 +13280,7 @@
       </p:sp>
       <p:pic>
         <p:nvPicPr>
-          <p:cNvPr id="117" name="Google Shape;117;p20"/>
+          <p:cNvPr id="123" name="Google Shape;123;p20"/>
           <p:cNvPicPr preferRelativeResize="0"/>
           <p:nvPr/>
         </p:nvPicPr>
@@ -12875,7 +13308,7 @@
       </p:pic>
       <p:pic>
         <p:nvPicPr>
-          <p:cNvPr id="118" name="Google Shape;118;p20"/>
+          <p:cNvPr id="124" name="Google Shape;124;p20"/>
           <p:cNvPicPr preferRelativeResize="0"/>
           <p:nvPr/>
         </p:nvPicPr>
@@ -12903,7 +13336,7 @@
       </p:pic>
       <p:sp>
         <p:nvSpPr>
-          <p:cNvPr id="119" name="Google Shape;119;p20"/>
+          <p:cNvPr id="125" name="Google Shape;125;p20"/>
           <p:cNvSpPr txBox="1"/>
           <p:nvPr/>
         </p:nvSpPr>
@@ -12949,7 +13382,7 @@
       </p:sp>
       <p:sp>
         <p:nvSpPr>
-          <p:cNvPr id="120" name="Google Shape;120;p20"/>
+          <p:cNvPr id="126" name="Google Shape;126;p20"/>
           <p:cNvSpPr txBox="1"/>
           <p:nvPr/>
         </p:nvSpPr>
@@ -13041,7 +13474,7 @@
   <p:cSld>
     <p:spTree>
       <p:nvGrpSpPr>
-        <p:cNvPr id="124" name="Shape 124"/>
+        <p:cNvPr id="130" name="Shape 130"/>
         <p:cNvGrpSpPr/>
         <p:nvPr/>
       </p:nvGrpSpPr>
@@ -13055,7 +13488,7 @@
       </p:grpSpPr>
       <p:sp>
         <p:nvSpPr>
-          <p:cNvPr id="125" name="Google Shape;125;p21"/>
+          <p:cNvPr id="131" name="Google Shape;131;p21"/>
           <p:cNvSpPr txBox="1"/>
           <p:nvPr>
             <p:ph idx="1" type="body"/>
@@ -13111,7 +13544,7 @@
       </p:sp>
       <p:pic>
         <p:nvPicPr>
-          <p:cNvPr id="126" name="Google Shape;126;p21"/>
+          <p:cNvPr id="132" name="Google Shape;132;p21"/>
           <p:cNvPicPr preferRelativeResize="0"/>
           <p:nvPr/>
         </p:nvPicPr>
@@ -13139,7 +13572,7 @@
       </p:pic>
       <p:sp>
         <p:nvSpPr>
-          <p:cNvPr id="127" name="Google Shape;127;p21"/>
+          <p:cNvPr id="133" name="Google Shape;133;p21"/>
           <p:cNvSpPr txBox="1"/>
           <p:nvPr/>
         </p:nvSpPr>
@@ -13217,14 +13650,14 @@
       </p:sp>
       <p:sp>
         <p:nvSpPr>
-          <p:cNvPr id="128" name="Google Shape;128;p21"/>
+          <p:cNvPr id="134" name="Google Shape;134;p21"/>
           <p:cNvSpPr txBox="1"/>
           <p:nvPr/>
         </p:nvSpPr>
         <p:spPr>
           <a:xfrm>
-            <a:off x="6458525" y="4167525"/>
-            <a:ext cx="1047300" cy="434700"/>
+            <a:off x="6482800" y="4167525"/>
+            <a:ext cx="1023000" cy="434700"/>
           </a:xfrm>
           <a:prstGeom prst="rect">
             <a:avLst/>
@@ -13326,6 +13759,285 @@
 </file>
 
 <file path=ppt/theme/theme1.xml><?xml version="1.0" encoding="utf-8"?>
+<a:theme xmlns:a="http://schemas.openxmlformats.org/drawingml/2006/main" xmlns:r="http://schemas.openxmlformats.org/officeDocument/2006/relationships" name="Coral">
+  <a:themeElements>
+    <a:clrScheme name="Coral">
+      <a:dk1>
+        <a:srgbClr val="9CC990"/>
+      </a:dk1>
+      <a:lt1>
+        <a:srgbClr val="FFFFFF"/>
+      </a:lt1>
+      <a:dk2>
+        <a:srgbClr val="5E696C"/>
+      </a:dk2>
+      <a:lt2>
+        <a:srgbClr val="BFC7CA"/>
+      </a:lt2>
+      <a:accent1>
+        <a:srgbClr val="1E2D31"/>
+      </a:accent1>
+      <a:accent2>
+        <a:srgbClr val="273C42"/>
+      </a:accent2>
+      <a:accent3>
+        <a:srgbClr val="83D061"/>
+      </a:accent3>
+      <a:accent4>
+        <a:srgbClr val="F6CD4C"/>
+      </a:accent4>
+      <a:accent5>
+        <a:srgbClr val="AF4345"/>
+      </a:accent5>
+      <a:accent6>
+        <a:srgbClr val="F58F8F"/>
+      </a:accent6>
+      <a:hlink>
+        <a:srgbClr val="AF4345"/>
+      </a:hlink>
+      <a:folHlink>
+        <a:srgbClr val="AF4345"/>
+      </a:folHlink>
+    </a:clrScheme>
+    <a:fontScheme name="Office">
+      <a:majorFont>
+        <a:latin typeface="Arial"/>
+        <a:ea typeface=""/>
+        <a:cs typeface=""/>
+        <a:font script="Jpan" typeface="ＭＳ Ｐゴシック"/>
+        <a:font script="Hang" typeface="맑은 고딕"/>
+        <a:font script="Hans" typeface="宋体"/>
+        <a:font script="Hant" typeface="新細明體"/>
+        <a:font script="Arab" typeface="Times New Roman"/>
+        <a:font script="Hebr" typeface="Times New Roman"/>
+        <a:font script="Thai" typeface="Angsana New"/>
+        <a:font script="Ethi" typeface="Nyala"/>
+        <a:font script="Beng" typeface="Vrinda"/>
+        <a:font script="Gujr" typeface="Shruti"/>
+        <a:font script="Khmr" typeface="MoolBoran"/>
+        <a:font script="Knda" typeface="Tunga"/>
+        <a:font script="Guru" typeface="Raavi"/>
+        <a:font script="Cans" typeface="Euphemia"/>
+        <a:font script="Cher" typeface="Plantagenet Cherokee"/>
+        <a:font script="Yiii" typeface="Microsoft Yi Baiti"/>
+        <a:font script="Tibt" typeface="Microsoft Himalaya"/>
+        <a:font script="Thaa" typeface="MV Boli"/>
+        <a:font script="Deva" typeface="Mangal"/>
+        <a:font script="Telu" typeface="Gautami"/>
+        <a:font script="Taml" typeface="Latha"/>
+        <a:font script="Syrc" typeface="Estrangelo Edessa"/>
+        <a:font script="Orya" typeface="Kalinga"/>
+        <a:font script="Mlym" typeface="Kartika"/>
+        <a:font script="Laoo" typeface="DokChampa"/>
+        <a:font script="Sinh" typeface="Iskoola Pota"/>
+        <a:font script="Mong" typeface="Mongolian Baiti"/>
+        <a:font script="Viet" typeface="Times New Roman"/>
+        <a:font script="Uigh" typeface="Microsoft Uighur"/>
+        <a:font script="Geor" typeface="Sylfaen"/>
+      </a:majorFont>
+      <a:minorFont>
+        <a:latin typeface="Arial"/>
+        <a:ea typeface=""/>
+        <a:cs typeface=""/>
+        <a:font script="Jpan" typeface="ＭＳ Ｐゴシック"/>
+        <a:font script="Hang" typeface="맑은 고딕"/>
+        <a:font script="Hans" typeface="宋体"/>
+        <a:font script="Hant" typeface="新細明體"/>
+        <a:font script="Arab" typeface="Arial"/>
+        <a:font script="Hebr" typeface="Arial"/>
+        <a:font script="Thai" typeface="Cordia New"/>
+        <a:font script="Ethi" typeface="Nyala"/>
+        <a:font script="Beng" typeface="Vrinda"/>
+        <a:font script="Gujr" typeface="Shruti"/>
+        <a:font script="Khmr" typeface="DaunPenh"/>
+        <a:font script="Knda" typeface="Tunga"/>
+        <a:font script="Guru" typeface="Raavi"/>
+        <a:font script="Cans" typeface="Euphemia"/>
+        <a:font script="Cher" typeface="Plantagenet Cherokee"/>
+        <a:font script="Yiii" typeface="Microsoft Yi Baiti"/>
+        <a:font script="Tibt" typeface="Microsoft Himalaya"/>
+        <a:font script="Thaa" typeface="MV Boli"/>
+        <a:font script="Deva" typeface="Mangal"/>
+        <a:font script="Telu" typeface="Gautami"/>
+        <a:font script="Taml" typeface="Latha"/>
+        <a:font script="Syrc" typeface="Estrangelo Edessa"/>
+        <a:font script="Orya" typeface="Kalinga"/>
+        <a:font script="Mlym" typeface="Kartika"/>
+        <a:font script="Laoo" typeface="DokChampa"/>
+        <a:font script="Sinh" typeface="Iskoola Pota"/>
+        <a:font script="Mong" typeface="Mongolian Baiti"/>
+        <a:font script="Viet" typeface="Arial"/>
+        <a:font script="Uigh" typeface="Microsoft Uighur"/>
+        <a:font script="Geor" typeface="Sylfaen"/>
+      </a:minorFont>
+    </a:fontScheme>
+    <a:fmtScheme name="Office">
+      <a:fillStyleLst>
+        <a:solidFill>
+          <a:schemeClr val="phClr"/>
+        </a:solidFill>
+        <a:gradFill rotWithShape="1">
+          <a:gsLst>
+            <a:gs pos="0">
+              <a:schemeClr val="phClr">
+                <a:tint val="50000"/>
+                <a:satMod val="300000"/>
+              </a:schemeClr>
+            </a:gs>
+            <a:gs pos="35000">
+              <a:schemeClr val="phClr">
+                <a:tint val="37000"/>
+                <a:satMod val="300000"/>
+              </a:schemeClr>
+            </a:gs>
+            <a:gs pos="100000">
+              <a:schemeClr val="phClr">
+                <a:tint val="15000"/>
+                <a:satMod val="350000"/>
+              </a:schemeClr>
+            </a:gs>
+          </a:gsLst>
+          <a:lin ang="16200000" scaled="1"/>
+        </a:gradFill>
+        <a:gradFill rotWithShape="1">
+          <a:gsLst>
+            <a:gs pos="0">
+              <a:schemeClr val="phClr">
+                <a:tint val="100000"/>
+                <a:shade val="100000"/>
+                <a:satMod val="130000"/>
+              </a:schemeClr>
+            </a:gs>
+            <a:gs pos="100000">
+              <a:schemeClr val="phClr">
+                <a:tint val="50000"/>
+                <a:shade val="100000"/>
+                <a:satMod val="350000"/>
+              </a:schemeClr>
+            </a:gs>
+          </a:gsLst>
+          <a:lin ang="16200000" scaled="0"/>
+        </a:gradFill>
+      </a:fillStyleLst>
+      <a:lnStyleLst>
+        <a:ln w="9525" cap="flat" cmpd="sng" algn="ctr">
+          <a:solidFill>
+            <a:schemeClr val="phClr">
+              <a:shade val="95000"/>
+              <a:satMod val="105000"/>
+            </a:schemeClr>
+          </a:solidFill>
+          <a:prstDash val="solid"/>
+        </a:ln>
+        <a:ln w="25400" cap="flat" cmpd="sng" algn="ctr">
+          <a:solidFill>
+            <a:schemeClr val="phClr"/>
+          </a:solidFill>
+          <a:prstDash val="solid"/>
+        </a:ln>
+        <a:ln w="38100" cap="flat" cmpd="sng" algn="ctr">
+          <a:solidFill>
+            <a:schemeClr val="phClr"/>
+          </a:solidFill>
+          <a:prstDash val="solid"/>
+        </a:ln>
+      </a:lnStyleLst>
+      <a:effectStyleLst>
+        <a:effectStyle>
+          <a:effectLst>
+            <a:outerShdw blurRad="40000" dist="20000" dir="5400000" rotWithShape="0">
+              <a:srgbClr val="000000">
+                <a:alpha val="38000"/>
+              </a:srgbClr>
+            </a:outerShdw>
+          </a:effectLst>
+        </a:effectStyle>
+        <a:effectStyle>
+          <a:effectLst>
+            <a:outerShdw blurRad="40000" dist="23000" dir="5400000" rotWithShape="0">
+              <a:srgbClr val="000000">
+                <a:alpha val="35000"/>
+              </a:srgbClr>
+            </a:outerShdw>
+          </a:effectLst>
+        </a:effectStyle>
+        <a:effectStyle>
+          <a:effectLst>
+            <a:outerShdw blurRad="40000" dist="23000" dir="5400000" rotWithShape="0">
+              <a:srgbClr val="000000">
+                <a:alpha val="35000"/>
+              </a:srgbClr>
+            </a:outerShdw>
+          </a:effectLst>
+          <a:scene3d>
+            <a:camera prst="orthographicFront">
+              <a:rot lat="0" lon="0" rev="0"/>
+            </a:camera>
+            <a:lightRig rig="threePt" dir="t">
+              <a:rot lat="0" lon="0" rev="1200000"/>
+            </a:lightRig>
+          </a:scene3d>
+          <a:sp3d>
+            <a:bevelT w="63500" h="25400"/>
+          </a:sp3d>
+        </a:effectStyle>
+      </a:effectStyleLst>
+      <a:bgFillStyleLst>
+        <a:solidFill>
+          <a:schemeClr val="phClr"/>
+        </a:solidFill>
+        <a:gradFill rotWithShape="1">
+          <a:gsLst>
+            <a:gs pos="0">
+              <a:schemeClr val="phClr">
+                <a:tint val="40000"/>
+                <a:satMod val="350000"/>
+              </a:schemeClr>
+            </a:gs>
+            <a:gs pos="40000">
+              <a:schemeClr val="phClr">
+                <a:tint val="45000"/>
+                <a:shade val="99000"/>
+                <a:satMod val="350000"/>
+              </a:schemeClr>
+            </a:gs>
+            <a:gs pos="100000">
+              <a:schemeClr val="phClr">
+                <a:shade val="20000"/>
+                <a:satMod val="255000"/>
+              </a:schemeClr>
+            </a:gs>
+          </a:gsLst>
+          <a:path path="circle">
+            <a:fillToRect l="50000" t="-80000" r="50000" b="180000"/>
+          </a:path>
+        </a:gradFill>
+        <a:gradFill rotWithShape="1">
+          <a:gsLst>
+            <a:gs pos="0">
+              <a:schemeClr val="phClr">
+                <a:tint val="80000"/>
+                <a:satMod val="300000"/>
+              </a:schemeClr>
+            </a:gs>
+            <a:gs pos="100000">
+              <a:schemeClr val="phClr">
+                <a:shade val="30000"/>
+                <a:satMod val="200000"/>
+              </a:schemeClr>
+            </a:gs>
+          </a:gsLst>
+          <a:path path="circle">
+            <a:fillToRect l="50000" t="50000" r="50000" b="50000"/>
+          </a:path>
+        </a:gradFill>
+      </a:bgFillStyleLst>
+    </a:fmtScheme>
+  </a:themeElements>
+</a:theme>
+</file>
+
+<file path=ppt/theme/theme2.xml><?xml version="1.0" encoding="utf-8"?>
 <a:theme xmlns:a="http://schemas.openxmlformats.org/drawingml/2006/main" xmlns:r="http://schemas.openxmlformats.org/officeDocument/2006/relationships">
   <a:themeElements>
     <a:clrScheme name="Default">
@@ -13602,283 +14314,4 @@
     </a:fmtScheme>
   </a:themeElements>
 </a:theme>
-</file>
-
-<file path=ppt/theme/theme2.xml><?xml version="1.0" encoding="utf-8"?>
-<a:theme xmlns:a="http://schemas.openxmlformats.org/drawingml/2006/main" xmlns:r="http://schemas.openxmlformats.org/officeDocument/2006/relationships" name="Coral">
-  <a:themeElements>
-    <a:clrScheme name="Coral">
-      <a:dk1>
-        <a:srgbClr val="9CC990"/>
-      </a:dk1>
-      <a:lt1>
-        <a:srgbClr val="FFFFFF"/>
-      </a:lt1>
-      <a:dk2>
-        <a:srgbClr val="5E696C"/>
-      </a:dk2>
-      <a:lt2>
-        <a:srgbClr val="BFC7CA"/>
-      </a:lt2>
-      <a:accent1>
-        <a:srgbClr val="1E2D31"/>
-      </a:accent1>
-      <a:accent2>
-        <a:srgbClr val="273C42"/>
-      </a:accent2>
-      <a:accent3>
-        <a:srgbClr val="83D061"/>
-      </a:accent3>
-      <a:accent4>
-        <a:srgbClr val="F6CD4C"/>
-      </a:accent4>
-      <a:accent5>
-        <a:srgbClr val="AF4345"/>
-      </a:accent5>
-      <a:accent6>
-        <a:srgbClr val="F58F8F"/>
-      </a:accent6>
-      <a:hlink>
-        <a:srgbClr val="AF4345"/>
-      </a:hlink>
-      <a:folHlink>
-        <a:srgbClr val="AF4345"/>
-      </a:folHlink>
-    </a:clrScheme>
-    <a:fontScheme name="Office">
-      <a:majorFont>
-        <a:latin typeface="Arial"/>
-        <a:ea typeface=""/>
-        <a:cs typeface=""/>
-        <a:font script="Jpan" typeface="ＭＳ Ｐゴシック"/>
-        <a:font script="Hang" typeface="맑은 고딕"/>
-        <a:font script="Hans" typeface="宋体"/>
-        <a:font script="Hant" typeface="新細明體"/>
-        <a:font script="Arab" typeface="Times New Roman"/>
-        <a:font script="Hebr" typeface="Times New Roman"/>
-        <a:font script="Thai" typeface="Angsana New"/>
-        <a:font script="Ethi" typeface="Nyala"/>
-        <a:font script="Beng" typeface="Vrinda"/>
-        <a:font script="Gujr" typeface="Shruti"/>
-        <a:font script="Khmr" typeface="MoolBoran"/>
-        <a:font script="Knda" typeface="Tunga"/>
-        <a:font script="Guru" typeface="Raavi"/>
-        <a:font script="Cans" typeface="Euphemia"/>
-        <a:font script="Cher" typeface="Plantagenet Cherokee"/>
-        <a:font script="Yiii" typeface="Microsoft Yi Baiti"/>
-        <a:font script="Tibt" typeface="Microsoft Himalaya"/>
-        <a:font script="Thaa" typeface="MV Boli"/>
-        <a:font script="Deva" typeface="Mangal"/>
-        <a:font script="Telu" typeface="Gautami"/>
-        <a:font script="Taml" typeface="Latha"/>
-        <a:font script="Syrc" typeface="Estrangelo Edessa"/>
-        <a:font script="Orya" typeface="Kalinga"/>
-        <a:font script="Mlym" typeface="Kartika"/>
-        <a:font script="Laoo" typeface="DokChampa"/>
-        <a:font script="Sinh" typeface="Iskoola Pota"/>
-        <a:font script="Mong" typeface="Mongolian Baiti"/>
-        <a:font script="Viet" typeface="Times New Roman"/>
-        <a:font script="Uigh" typeface="Microsoft Uighur"/>
-        <a:font script="Geor" typeface="Sylfaen"/>
-      </a:majorFont>
-      <a:minorFont>
-        <a:latin typeface="Arial"/>
-        <a:ea typeface=""/>
-        <a:cs typeface=""/>
-        <a:font script="Jpan" typeface="ＭＳ Ｐゴシック"/>
-        <a:font script="Hang" typeface="맑은 고딕"/>
-        <a:font script="Hans" typeface="宋体"/>
-        <a:font script="Hant" typeface="新細明體"/>
-        <a:font script="Arab" typeface="Arial"/>
-        <a:font script="Hebr" typeface="Arial"/>
-        <a:font script="Thai" typeface="Cordia New"/>
-        <a:font script="Ethi" typeface="Nyala"/>
-        <a:font script="Beng" typeface="Vrinda"/>
-        <a:font script="Gujr" typeface="Shruti"/>
-        <a:font script="Khmr" typeface="DaunPenh"/>
-        <a:font script="Knda" typeface="Tunga"/>
-        <a:font script="Guru" typeface="Raavi"/>
-        <a:font script="Cans" typeface="Euphemia"/>
-        <a:font script="Cher" typeface="Plantagenet Cherokee"/>
-        <a:font script="Yiii" typeface="Microsoft Yi Baiti"/>
-        <a:font script="Tibt" typeface="Microsoft Himalaya"/>
-        <a:font script="Thaa" typeface="MV Boli"/>
-        <a:font script="Deva" typeface="Mangal"/>
-        <a:font script="Telu" typeface="Gautami"/>
-        <a:font script="Taml" typeface="Latha"/>
-        <a:font script="Syrc" typeface="Estrangelo Edessa"/>
-        <a:font script="Orya" typeface="Kalinga"/>
-        <a:font script="Mlym" typeface="Kartika"/>
-        <a:font script="Laoo" typeface="DokChampa"/>
-        <a:font script="Sinh" typeface="Iskoola Pota"/>
-        <a:font script="Mong" typeface="Mongolian Baiti"/>
-        <a:font script="Viet" typeface="Arial"/>
-        <a:font script="Uigh" typeface="Microsoft Uighur"/>
-        <a:font script="Geor" typeface="Sylfaen"/>
-      </a:minorFont>
-    </a:fontScheme>
-    <a:fmtScheme name="Office">
-      <a:fillStyleLst>
-        <a:solidFill>
-          <a:schemeClr val="phClr"/>
-        </a:solidFill>
-        <a:gradFill rotWithShape="1">
-          <a:gsLst>
-            <a:gs pos="0">
-              <a:schemeClr val="phClr">
-                <a:tint val="50000"/>
-                <a:satMod val="300000"/>
-              </a:schemeClr>
-            </a:gs>
-            <a:gs pos="35000">
-              <a:schemeClr val="phClr">
-                <a:tint val="37000"/>
-                <a:satMod val="300000"/>
-              </a:schemeClr>
-            </a:gs>
-            <a:gs pos="100000">
-              <a:schemeClr val="phClr">
-                <a:tint val="15000"/>
-                <a:satMod val="350000"/>
-              </a:schemeClr>
-            </a:gs>
-          </a:gsLst>
-          <a:lin ang="16200000" scaled="1"/>
-        </a:gradFill>
-        <a:gradFill rotWithShape="1">
-          <a:gsLst>
-            <a:gs pos="0">
-              <a:schemeClr val="phClr">
-                <a:tint val="100000"/>
-                <a:shade val="100000"/>
-                <a:satMod val="130000"/>
-              </a:schemeClr>
-            </a:gs>
-            <a:gs pos="100000">
-              <a:schemeClr val="phClr">
-                <a:tint val="50000"/>
-                <a:shade val="100000"/>
-                <a:satMod val="350000"/>
-              </a:schemeClr>
-            </a:gs>
-          </a:gsLst>
-          <a:lin ang="16200000" scaled="0"/>
-        </a:gradFill>
-      </a:fillStyleLst>
-      <a:lnStyleLst>
-        <a:ln w="9525" cap="flat" cmpd="sng" algn="ctr">
-          <a:solidFill>
-            <a:schemeClr val="phClr">
-              <a:shade val="95000"/>
-              <a:satMod val="105000"/>
-            </a:schemeClr>
-          </a:solidFill>
-          <a:prstDash val="solid"/>
-        </a:ln>
-        <a:ln w="25400" cap="flat" cmpd="sng" algn="ctr">
-          <a:solidFill>
-            <a:schemeClr val="phClr"/>
-          </a:solidFill>
-          <a:prstDash val="solid"/>
-        </a:ln>
-        <a:ln w="38100" cap="flat" cmpd="sng" algn="ctr">
-          <a:solidFill>
-            <a:schemeClr val="phClr"/>
-          </a:solidFill>
-          <a:prstDash val="solid"/>
-        </a:ln>
-      </a:lnStyleLst>
-      <a:effectStyleLst>
-        <a:effectStyle>
-          <a:effectLst>
-            <a:outerShdw blurRad="40000" dist="20000" dir="5400000" rotWithShape="0">
-              <a:srgbClr val="000000">
-                <a:alpha val="38000"/>
-              </a:srgbClr>
-            </a:outerShdw>
-          </a:effectLst>
-        </a:effectStyle>
-        <a:effectStyle>
-          <a:effectLst>
-            <a:outerShdw blurRad="40000" dist="23000" dir="5400000" rotWithShape="0">
-              <a:srgbClr val="000000">
-                <a:alpha val="35000"/>
-              </a:srgbClr>
-            </a:outerShdw>
-          </a:effectLst>
-        </a:effectStyle>
-        <a:effectStyle>
-          <a:effectLst>
-            <a:outerShdw blurRad="40000" dist="23000" dir="5400000" rotWithShape="0">
-              <a:srgbClr val="000000">
-                <a:alpha val="35000"/>
-              </a:srgbClr>
-            </a:outerShdw>
-          </a:effectLst>
-          <a:scene3d>
-            <a:camera prst="orthographicFront">
-              <a:rot lat="0" lon="0" rev="0"/>
-            </a:camera>
-            <a:lightRig rig="threePt" dir="t">
-              <a:rot lat="0" lon="0" rev="1200000"/>
-            </a:lightRig>
-          </a:scene3d>
-          <a:sp3d>
-            <a:bevelT w="63500" h="25400"/>
-          </a:sp3d>
-        </a:effectStyle>
-      </a:effectStyleLst>
-      <a:bgFillStyleLst>
-        <a:solidFill>
-          <a:schemeClr val="phClr"/>
-        </a:solidFill>
-        <a:gradFill rotWithShape="1">
-          <a:gsLst>
-            <a:gs pos="0">
-              <a:schemeClr val="phClr">
-                <a:tint val="40000"/>
-                <a:satMod val="350000"/>
-              </a:schemeClr>
-            </a:gs>
-            <a:gs pos="40000">
-              <a:schemeClr val="phClr">
-                <a:tint val="45000"/>
-                <a:shade val="99000"/>
-                <a:satMod val="350000"/>
-              </a:schemeClr>
-            </a:gs>
-            <a:gs pos="100000">
-              <a:schemeClr val="phClr">
-                <a:shade val="20000"/>
-                <a:satMod val="255000"/>
-              </a:schemeClr>
-            </a:gs>
-          </a:gsLst>
-          <a:path path="circle">
-            <a:fillToRect l="50000" t="-80000" r="50000" b="180000"/>
-          </a:path>
-        </a:gradFill>
-        <a:gradFill rotWithShape="1">
-          <a:gsLst>
-            <a:gs pos="0">
-              <a:schemeClr val="phClr">
-                <a:tint val="80000"/>
-                <a:satMod val="300000"/>
-              </a:schemeClr>
-            </a:gs>
-            <a:gs pos="100000">
-              <a:schemeClr val="phClr">
-                <a:shade val="30000"/>
-                <a:satMod val="200000"/>
-              </a:schemeClr>
-            </a:gs>
-          </a:gsLst>
-          <a:path path="circle">
-            <a:fillToRect l="50000" t="50000" r="50000" b="50000"/>
-          </a:path>
-        </a:gradFill>
-      </a:bgFillStyleLst>
-    </a:fmtScheme>
-  </a:themeElements>
-</a:theme>
 </file>
</xml_diff>